<commit_message>
Anyadint retocs de la presentacio per al dia 11-4-22, de tot lo que duc fet del projectefinal fins ara
</commit_message>
<xml_diff>
--- a/Presentacio del projectefinal 11-4-22.pptx
+++ b/Presentacio del projectefinal 11-4-22.pptx
@@ -4,6 +4,9 @@
   <p:sldMasterIdLst>
     <p:sldMasterId id="2147483660" r:id="rId1"/>
   </p:sldMasterIdLst>
+  <p:notesMasterIdLst>
+    <p:notesMasterId r:id="rId29"/>
+  </p:notesMasterIdLst>
   <p:sldIdLst>
     <p:sldId id="256" r:id="rId2"/>
     <p:sldId id="257" r:id="rId3"/>
@@ -12,6 +15,26 @@
     <p:sldId id="260" r:id="rId6"/>
     <p:sldId id="261" r:id="rId7"/>
     <p:sldId id="262" r:id="rId8"/>
+    <p:sldId id="263" r:id="rId9"/>
+    <p:sldId id="264" r:id="rId10"/>
+    <p:sldId id="265" r:id="rId11"/>
+    <p:sldId id="266" r:id="rId12"/>
+    <p:sldId id="267" r:id="rId13"/>
+    <p:sldId id="268" r:id="rId14"/>
+    <p:sldId id="269" r:id="rId15"/>
+    <p:sldId id="270" r:id="rId16"/>
+    <p:sldId id="271" r:id="rId17"/>
+    <p:sldId id="272" r:id="rId18"/>
+    <p:sldId id="273" r:id="rId19"/>
+    <p:sldId id="274" r:id="rId20"/>
+    <p:sldId id="275" r:id="rId21"/>
+    <p:sldId id="276" r:id="rId22"/>
+    <p:sldId id="277" r:id="rId23"/>
+    <p:sldId id="278" r:id="rId24"/>
+    <p:sldId id="279" r:id="rId25"/>
+    <p:sldId id="280" r:id="rId26"/>
+    <p:sldId id="281" r:id="rId27"/>
+    <p:sldId id="282" r:id="rId28"/>
   </p:sldIdLst>
   <p:sldSz cx="12192000" cy="6858000"/>
   <p:notesSz cx="6858000" cy="9144000"/>
@@ -110,7 +133,445 @@
       </a:defRPr>
     </a:lvl9pPr>
   </p:defaultTextStyle>
+  <p:extLst>
+    <p:ext uri="{EFAFB233-063F-42B5-8137-9DF3F51BA10A}">
+      <p15:sldGuideLst xmlns:p15="http://schemas.microsoft.com/office/powerpoint/2012/main"/>
+    </p:ext>
+  </p:extLst>
 </p:presentation>
+</file>
+
+<file path=ppt/notesMasters/notesMaster1.xml><?xml version="1.0" encoding="utf-8"?>
+<p:notesMaster xmlns:a="http://schemas.openxmlformats.org/drawingml/2006/main" xmlns:r="http://schemas.openxmlformats.org/officeDocument/2006/relationships" xmlns:p="http://schemas.openxmlformats.org/presentationml/2006/main">
+  <p:cSld>
+    <p:bg>
+      <p:bgRef idx="1001">
+        <a:schemeClr val="bg1"/>
+      </p:bgRef>
+    </p:bg>
+    <p:spTree>
+      <p:nvGrpSpPr>
+        <p:cNvPr id="1" name=""/>
+        <p:cNvGrpSpPr/>
+        <p:nvPr/>
+      </p:nvGrpSpPr>
+      <p:grpSpPr>
+        <a:xfrm>
+          <a:off x="0" y="0"/>
+          <a:ext cx="0" cy="0"/>
+          <a:chOff x="0" y="0"/>
+          <a:chExt cx="0" cy="0"/>
+        </a:xfrm>
+      </p:grpSpPr>
+      <p:sp>
+        <p:nvSpPr>
+          <p:cNvPr id="2" name="Marcador de encabezado 1"/>
+          <p:cNvSpPr>
+            <a:spLocks noGrp="1"/>
+          </p:cNvSpPr>
+          <p:nvPr>
+            <p:ph type="hdr" sz="quarter"/>
+          </p:nvPr>
+        </p:nvSpPr>
+        <p:spPr>
+          <a:xfrm>
+            <a:off x="0" y="0"/>
+            <a:ext cx="2971800" cy="458788"/>
+          </a:xfrm>
+          <a:prstGeom prst="rect">
+            <a:avLst/>
+          </a:prstGeom>
+        </p:spPr>
+        <p:txBody>
+          <a:bodyPr vert="horz" lIns="91440" tIns="45720" rIns="91440" bIns="45720" rtlCol="0"/>
+          <a:lstStyle>
+            <a:lvl1pPr algn="l">
+              <a:defRPr sz="1200"/>
+            </a:lvl1pPr>
+          </a:lstStyle>
+          <a:p>
+            <a:endParaRPr lang="es-ES"/>
+          </a:p>
+        </p:txBody>
+      </p:sp>
+      <p:sp>
+        <p:nvSpPr>
+          <p:cNvPr id="3" name="Marcador de fecha 2"/>
+          <p:cNvSpPr>
+            <a:spLocks noGrp="1"/>
+          </p:cNvSpPr>
+          <p:nvPr>
+            <p:ph type="dt" idx="1"/>
+          </p:nvPr>
+        </p:nvSpPr>
+        <p:spPr>
+          <a:xfrm>
+            <a:off x="3884613" y="0"/>
+            <a:ext cx="2971800" cy="458788"/>
+          </a:xfrm>
+          <a:prstGeom prst="rect">
+            <a:avLst/>
+          </a:prstGeom>
+        </p:spPr>
+        <p:txBody>
+          <a:bodyPr vert="horz" lIns="91440" tIns="45720" rIns="91440" bIns="45720" rtlCol="0"/>
+          <a:lstStyle>
+            <a:lvl1pPr algn="r">
+              <a:defRPr sz="1200"/>
+            </a:lvl1pPr>
+          </a:lstStyle>
+          <a:p>
+            <a:fld id="{C19F3963-2141-4695-B017-115AEC5BDBD9}" type="datetimeFigureOut">
+              <a:rPr lang="es-ES" smtClean="0"/>
+              <a:t>10/04/2022</a:t>
+            </a:fld>
+            <a:endParaRPr lang="es-ES"/>
+          </a:p>
+        </p:txBody>
+      </p:sp>
+      <p:sp>
+        <p:nvSpPr>
+          <p:cNvPr id="4" name="Marcador de imagen de diapositiva 3"/>
+          <p:cNvSpPr>
+            <a:spLocks noGrp="1" noRot="1" noChangeAspect="1"/>
+          </p:cNvSpPr>
+          <p:nvPr>
+            <p:ph type="sldImg" idx="2"/>
+          </p:nvPr>
+        </p:nvSpPr>
+        <p:spPr>
+          <a:xfrm>
+            <a:off x="685800" y="1143000"/>
+            <a:ext cx="5486400" cy="3086100"/>
+          </a:xfrm>
+          <a:prstGeom prst="rect">
+            <a:avLst/>
+          </a:prstGeom>
+          <a:noFill/>
+          <a:ln w="12700">
+            <a:solidFill>
+              <a:prstClr val="black"/>
+            </a:solidFill>
+          </a:ln>
+        </p:spPr>
+        <p:txBody>
+          <a:bodyPr vert="horz" lIns="91440" tIns="45720" rIns="91440" bIns="45720" rtlCol="0" anchor="ctr"/>
+          <a:lstStyle/>
+          <a:p>
+            <a:endParaRPr lang="es-ES"/>
+          </a:p>
+        </p:txBody>
+      </p:sp>
+      <p:sp>
+        <p:nvSpPr>
+          <p:cNvPr id="5" name="Marcador de notas 4"/>
+          <p:cNvSpPr>
+            <a:spLocks noGrp="1"/>
+          </p:cNvSpPr>
+          <p:nvPr>
+            <p:ph type="body" sz="quarter" idx="3"/>
+          </p:nvPr>
+        </p:nvSpPr>
+        <p:spPr>
+          <a:xfrm>
+            <a:off x="685800" y="4400550"/>
+            <a:ext cx="5486400" cy="3600450"/>
+          </a:xfrm>
+          <a:prstGeom prst="rect">
+            <a:avLst/>
+          </a:prstGeom>
+        </p:spPr>
+        <p:txBody>
+          <a:bodyPr vert="horz" lIns="91440" tIns="45720" rIns="91440" bIns="45720" rtlCol="0"/>
+          <a:lstStyle/>
+          <a:p>
+            <a:pPr lvl="0"/>
+            <a:r>
+              <a:rPr lang="es-ES"/>
+              <a:t>Haga clic para modificar los estilos de texto del patrón</a:t>
+            </a:r>
+          </a:p>
+          <a:p>
+            <a:pPr lvl="1"/>
+            <a:r>
+              <a:rPr lang="es-ES"/>
+              <a:t>Segundo nivel</a:t>
+            </a:r>
+          </a:p>
+          <a:p>
+            <a:pPr lvl="2"/>
+            <a:r>
+              <a:rPr lang="es-ES"/>
+              <a:t>Tercer nivel</a:t>
+            </a:r>
+          </a:p>
+          <a:p>
+            <a:pPr lvl="3"/>
+            <a:r>
+              <a:rPr lang="es-ES"/>
+              <a:t>Cuarto nivel</a:t>
+            </a:r>
+          </a:p>
+          <a:p>
+            <a:pPr lvl="4"/>
+            <a:r>
+              <a:rPr lang="es-ES"/>
+              <a:t>Quinto nivel</a:t>
+            </a:r>
+          </a:p>
+        </p:txBody>
+      </p:sp>
+      <p:sp>
+        <p:nvSpPr>
+          <p:cNvPr id="6" name="Marcador de pie de página 5"/>
+          <p:cNvSpPr>
+            <a:spLocks noGrp="1"/>
+          </p:cNvSpPr>
+          <p:nvPr>
+            <p:ph type="ftr" sz="quarter" idx="4"/>
+          </p:nvPr>
+        </p:nvSpPr>
+        <p:spPr>
+          <a:xfrm>
+            <a:off x="0" y="8685213"/>
+            <a:ext cx="2971800" cy="458787"/>
+          </a:xfrm>
+          <a:prstGeom prst="rect">
+            <a:avLst/>
+          </a:prstGeom>
+        </p:spPr>
+        <p:txBody>
+          <a:bodyPr vert="horz" lIns="91440" tIns="45720" rIns="91440" bIns="45720" rtlCol="0" anchor="b"/>
+          <a:lstStyle>
+            <a:lvl1pPr algn="l">
+              <a:defRPr sz="1200"/>
+            </a:lvl1pPr>
+          </a:lstStyle>
+          <a:p>
+            <a:endParaRPr lang="es-ES"/>
+          </a:p>
+        </p:txBody>
+      </p:sp>
+      <p:sp>
+        <p:nvSpPr>
+          <p:cNvPr id="7" name="Marcador de número de diapositiva 6"/>
+          <p:cNvSpPr>
+            <a:spLocks noGrp="1"/>
+          </p:cNvSpPr>
+          <p:nvPr>
+            <p:ph type="sldNum" sz="quarter" idx="5"/>
+          </p:nvPr>
+        </p:nvSpPr>
+        <p:spPr>
+          <a:xfrm>
+            <a:off x="3884613" y="8685213"/>
+            <a:ext cx="2971800" cy="458787"/>
+          </a:xfrm>
+          <a:prstGeom prst="rect">
+            <a:avLst/>
+          </a:prstGeom>
+        </p:spPr>
+        <p:txBody>
+          <a:bodyPr vert="horz" lIns="91440" tIns="45720" rIns="91440" bIns="45720" rtlCol="0" anchor="b"/>
+          <a:lstStyle>
+            <a:lvl1pPr algn="r">
+              <a:defRPr sz="1200"/>
+            </a:lvl1pPr>
+          </a:lstStyle>
+          <a:p>
+            <a:fld id="{64A47C21-83DD-4474-B542-5C52D3EE8126}" type="slidenum">
+              <a:rPr lang="es-ES" smtClean="0"/>
+              <a:t>‹Nº›</a:t>
+            </a:fld>
+            <a:endParaRPr lang="es-ES"/>
+          </a:p>
+        </p:txBody>
+      </p:sp>
+    </p:spTree>
+    <p:extLst>
+      <p:ext uri="{BB962C8B-B14F-4D97-AF65-F5344CB8AC3E}">
+        <p14:creationId xmlns:p14="http://schemas.microsoft.com/office/powerpoint/2010/main" val="3146589027"/>
+      </p:ext>
+    </p:extLst>
+  </p:cSld>
+  <p:clrMap bg1="lt1" tx1="dk1" bg2="lt2" tx2="dk2" accent1="accent1" accent2="accent2" accent3="accent3" accent4="accent4" accent5="accent5" accent6="accent6" hlink="hlink" folHlink="folHlink"/>
+  <p:notesStyle>
+    <a:lvl1pPr marL="0" algn="l" defTabSz="914400" rtl="0" eaLnBrk="1" latinLnBrk="0" hangingPunct="1">
+      <a:defRPr sz="1200" kern="1200">
+        <a:solidFill>
+          <a:schemeClr val="tx1"/>
+        </a:solidFill>
+        <a:latin typeface="+mn-lt"/>
+        <a:ea typeface="+mn-ea"/>
+        <a:cs typeface="+mn-cs"/>
+      </a:defRPr>
+    </a:lvl1pPr>
+    <a:lvl2pPr marL="457200" algn="l" defTabSz="914400" rtl="0" eaLnBrk="1" latinLnBrk="0" hangingPunct="1">
+      <a:defRPr sz="1200" kern="1200">
+        <a:solidFill>
+          <a:schemeClr val="tx1"/>
+        </a:solidFill>
+        <a:latin typeface="+mn-lt"/>
+        <a:ea typeface="+mn-ea"/>
+        <a:cs typeface="+mn-cs"/>
+      </a:defRPr>
+    </a:lvl2pPr>
+    <a:lvl3pPr marL="914400" algn="l" defTabSz="914400" rtl="0" eaLnBrk="1" latinLnBrk="0" hangingPunct="1">
+      <a:defRPr sz="1200" kern="1200">
+        <a:solidFill>
+          <a:schemeClr val="tx1"/>
+        </a:solidFill>
+        <a:latin typeface="+mn-lt"/>
+        <a:ea typeface="+mn-ea"/>
+        <a:cs typeface="+mn-cs"/>
+      </a:defRPr>
+    </a:lvl3pPr>
+    <a:lvl4pPr marL="1371600" algn="l" defTabSz="914400" rtl="0" eaLnBrk="1" latinLnBrk="0" hangingPunct="1">
+      <a:defRPr sz="1200" kern="1200">
+        <a:solidFill>
+          <a:schemeClr val="tx1"/>
+        </a:solidFill>
+        <a:latin typeface="+mn-lt"/>
+        <a:ea typeface="+mn-ea"/>
+        <a:cs typeface="+mn-cs"/>
+      </a:defRPr>
+    </a:lvl4pPr>
+    <a:lvl5pPr marL="1828800" algn="l" defTabSz="914400" rtl="0" eaLnBrk="1" latinLnBrk="0" hangingPunct="1">
+      <a:defRPr sz="1200" kern="1200">
+        <a:solidFill>
+          <a:schemeClr val="tx1"/>
+        </a:solidFill>
+        <a:latin typeface="+mn-lt"/>
+        <a:ea typeface="+mn-ea"/>
+        <a:cs typeface="+mn-cs"/>
+      </a:defRPr>
+    </a:lvl5pPr>
+    <a:lvl6pPr marL="2286000" algn="l" defTabSz="914400" rtl="0" eaLnBrk="1" latinLnBrk="0" hangingPunct="1">
+      <a:defRPr sz="1200" kern="1200">
+        <a:solidFill>
+          <a:schemeClr val="tx1"/>
+        </a:solidFill>
+        <a:latin typeface="+mn-lt"/>
+        <a:ea typeface="+mn-ea"/>
+        <a:cs typeface="+mn-cs"/>
+      </a:defRPr>
+    </a:lvl6pPr>
+    <a:lvl7pPr marL="2743200" algn="l" defTabSz="914400" rtl="0" eaLnBrk="1" latinLnBrk="0" hangingPunct="1">
+      <a:defRPr sz="1200" kern="1200">
+        <a:solidFill>
+          <a:schemeClr val="tx1"/>
+        </a:solidFill>
+        <a:latin typeface="+mn-lt"/>
+        <a:ea typeface="+mn-ea"/>
+        <a:cs typeface="+mn-cs"/>
+      </a:defRPr>
+    </a:lvl7pPr>
+    <a:lvl8pPr marL="3200400" algn="l" defTabSz="914400" rtl="0" eaLnBrk="1" latinLnBrk="0" hangingPunct="1">
+      <a:defRPr sz="1200" kern="1200">
+        <a:solidFill>
+          <a:schemeClr val="tx1"/>
+        </a:solidFill>
+        <a:latin typeface="+mn-lt"/>
+        <a:ea typeface="+mn-ea"/>
+        <a:cs typeface="+mn-cs"/>
+      </a:defRPr>
+    </a:lvl8pPr>
+    <a:lvl9pPr marL="3657600" algn="l" defTabSz="914400" rtl="0" eaLnBrk="1" latinLnBrk="0" hangingPunct="1">
+      <a:defRPr sz="1200" kern="1200">
+        <a:solidFill>
+          <a:schemeClr val="tx1"/>
+        </a:solidFill>
+        <a:latin typeface="+mn-lt"/>
+        <a:ea typeface="+mn-ea"/>
+        <a:cs typeface="+mn-cs"/>
+      </a:defRPr>
+    </a:lvl9pPr>
+  </p:notesStyle>
+</p:notesMaster>
+</file>
+
+<file path=ppt/notesSlides/notesSlide1.xml><?xml version="1.0" encoding="utf-8"?>
+<p:notes xmlns:a="http://schemas.openxmlformats.org/drawingml/2006/main" xmlns:r="http://schemas.openxmlformats.org/officeDocument/2006/relationships" xmlns:p="http://schemas.openxmlformats.org/presentationml/2006/main">
+  <p:cSld>
+    <p:spTree>
+      <p:nvGrpSpPr>
+        <p:cNvPr id="1" name=""/>
+        <p:cNvGrpSpPr/>
+        <p:nvPr/>
+      </p:nvGrpSpPr>
+      <p:grpSpPr>
+        <a:xfrm>
+          <a:off x="0" y="0"/>
+          <a:ext cx="0" cy="0"/>
+          <a:chOff x="0" y="0"/>
+          <a:chExt cx="0" cy="0"/>
+        </a:xfrm>
+      </p:grpSpPr>
+      <p:sp>
+        <p:nvSpPr>
+          <p:cNvPr id="2" name="Marcador de imagen de diapositiva 1"/>
+          <p:cNvSpPr>
+            <a:spLocks noGrp="1" noRot="1" noChangeAspect="1"/>
+          </p:cNvSpPr>
+          <p:nvPr>
+            <p:ph type="sldImg"/>
+          </p:nvPr>
+        </p:nvSpPr>
+        <p:spPr/>
+      </p:sp>
+      <p:sp>
+        <p:nvSpPr>
+          <p:cNvPr id="3" name="Marcador de notas 2"/>
+          <p:cNvSpPr>
+            <a:spLocks noGrp="1"/>
+          </p:cNvSpPr>
+          <p:nvPr>
+            <p:ph type="body" idx="1"/>
+          </p:nvPr>
+        </p:nvSpPr>
+        <p:spPr/>
+        <p:txBody>
+          <a:bodyPr/>
+          <a:lstStyle/>
+          <a:p>
+            <a:endParaRPr lang="es-ES" dirty="0"/>
+          </a:p>
+        </p:txBody>
+      </p:sp>
+      <p:sp>
+        <p:nvSpPr>
+          <p:cNvPr id="4" name="Marcador de número de diapositiva 3"/>
+          <p:cNvSpPr>
+            <a:spLocks noGrp="1"/>
+          </p:cNvSpPr>
+          <p:nvPr>
+            <p:ph type="sldNum" sz="quarter" idx="5"/>
+          </p:nvPr>
+        </p:nvSpPr>
+        <p:spPr/>
+        <p:txBody>
+          <a:bodyPr/>
+          <a:lstStyle/>
+          <a:p>
+            <a:fld id="{64A47C21-83DD-4474-B542-5C52D3EE8126}" type="slidenum">
+              <a:rPr lang="es-ES" smtClean="0"/>
+              <a:t>22</a:t>
+            </a:fld>
+            <a:endParaRPr lang="es-ES"/>
+          </a:p>
+        </p:txBody>
+      </p:sp>
+    </p:spTree>
+    <p:extLst>
+      <p:ext uri="{BB962C8B-B14F-4D97-AF65-F5344CB8AC3E}">
+        <p14:creationId xmlns:p14="http://schemas.microsoft.com/office/powerpoint/2010/main" val="3939330361"/>
+      </p:ext>
+    </p:extLst>
+  </p:cSld>
+  <p:clrMapOvr>
+    <a:masterClrMapping/>
+  </p:clrMapOvr>
+</p:notes>
 </file>
 
 <file path=ppt/slideLayouts/slideLayout1.xml><?xml version="1.0" encoding="utf-8"?>
@@ -283,7 +744,7 @@
           <a:p>
             <a:fld id="{753845EA-C31C-451A-95A1-ED286AADADFD}" type="datetimeFigureOut">
               <a:rPr lang="es-ES" smtClean="0"/>
-              <a:t>09/04/2022</a:t>
+              <a:t>10/04/2022</a:t>
             </a:fld>
             <a:endParaRPr lang="es-ES"/>
           </a:p>
@@ -550,7 +1011,7 @@
           <a:p>
             <a:fld id="{753845EA-C31C-451A-95A1-ED286AADADFD}" type="datetimeFigureOut">
               <a:rPr lang="es-ES" smtClean="0"/>
-              <a:t>09/04/2022</a:t>
+              <a:t>10/04/2022</a:t>
             </a:fld>
             <a:endParaRPr lang="es-ES"/>
           </a:p>
@@ -781,7 +1242,7 @@
           <a:p>
             <a:fld id="{753845EA-C31C-451A-95A1-ED286AADADFD}" type="datetimeFigureOut">
               <a:rPr lang="es-ES" smtClean="0"/>
-              <a:t>09/04/2022</a:t>
+              <a:t>10/04/2022</a:t>
             </a:fld>
             <a:endParaRPr lang="es-ES"/>
           </a:p>
@@ -1091,7 +1552,7 @@
           <a:p>
             <a:fld id="{753845EA-C31C-451A-95A1-ED286AADADFD}" type="datetimeFigureOut">
               <a:rPr lang="es-ES" smtClean="0"/>
-              <a:t>09/04/2022</a:t>
+              <a:t>10/04/2022</a:t>
             </a:fld>
             <a:endParaRPr lang="es-ES"/>
           </a:p>
@@ -1564,7 +2025,7 @@
           <a:p>
             <a:fld id="{753845EA-C31C-451A-95A1-ED286AADADFD}" type="datetimeFigureOut">
               <a:rPr lang="es-ES" smtClean="0"/>
-              <a:t>09/04/2022</a:t>
+              <a:t>10/04/2022</a:t>
             </a:fld>
             <a:endParaRPr lang="es-ES"/>
           </a:p>
@@ -2111,7 +2572,7 @@
           <a:p>
             <a:fld id="{753845EA-C31C-451A-95A1-ED286AADADFD}" type="datetimeFigureOut">
               <a:rPr lang="es-ES" smtClean="0"/>
-              <a:t>09/04/2022</a:t>
+              <a:t>10/04/2022</a:t>
             </a:fld>
             <a:endParaRPr lang="es-ES"/>
           </a:p>
@@ -2885,7 +3346,7 @@
           <a:p>
             <a:fld id="{753845EA-C31C-451A-95A1-ED286AADADFD}" type="datetimeFigureOut">
               <a:rPr lang="es-ES" smtClean="0"/>
-              <a:t>09/04/2022</a:t>
+              <a:t>10/04/2022</a:t>
             </a:fld>
             <a:endParaRPr lang="es-ES"/>
           </a:p>
@@ -3060,7 +3521,7 @@
           <a:p>
             <a:fld id="{753845EA-C31C-451A-95A1-ED286AADADFD}" type="datetimeFigureOut">
               <a:rPr lang="es-ES" smtClean="0"/>
-              <a:t>09/04/2022</a:t>
+              <a:t>10/04/2022</a:t>
             </a:fld>
             <a:endParaRPr lang="es-ES"/>
           </a:p>
@@ -3283,7 +3744,7 @@
           <a:p>
             <a:fld id="{753845EA-C31C-451A-95A1-ED286AADADFD}" type="datetimeFigureOut">
               <a:rPr lang="es-ES" smtClean="0"/>
-              <a:t>09/04/2022</a:t>
+              <a:t>10/04/2022</a:t>
             </a:fld>
             <a:endParaRPr lang="es-ES"/>
           </a:p>
@@ -3463,7 +3924,7 @@
           <a:p>
             <a:fld id="{753845EA-C31C-451A-95A1-ED286AADADFD}" type="datetimeFigureOut">
               <a:rPr lang="es-ES" smtClean="0"/>
-              <a:t>09/04/2022</a:t>
+              <a:t>10/04/2022</a:t>
             </a:fld>
             <a:endParaRPr lang="es-ES"/>
           </a:p>
@@ -3752,7 +4213,7 @@
           <a:p>
             <a:fld id="{753845EA-C31C-451A-95A1-ED286AADADFD}" type="datetimeFigureOut">
               <a:rPr lang="es-ES" smtClean="0"/>
-              <a:t>09/04/2022</a:t>
+              <a:t>10/04/2022</a:t>
             </a:fld>
             <a:endParaRPr lang="es-ES"/>
           </a:p>
@@ -3994,7 +4455,7 @@
           <a:p>
             <a:fld id="{753845EA-C31C-451A-95A1-ED286AADADFD}" type="datetimeFigureOut">
               <a:rPr lang="es-ES" smtClean="0"/>
-              <a:t>09/04/2022</a:t>
+              <a:t>10/04/2022</a:t>
             </a:fld>
             <a:endParaRPr lang="es-ES"/>
           </a:p>
@@ -4373,7 +4834,7 @@
           <a:p>
             <a:fld id="{753845EA-C31C-451A-95A1-ED286AADADFD}" type="datetimeFigureOut">
               <a:rPr lang="es-ES" smtClean="0"/>
-              <a:t>09/04/2022</a:t>
+              <a:t>10/04/2022</a:t>
             </a:fld>
             <a:endParaRPr lang="es-ES"/>
           </a:p>
@@ -4491,7 +4952,7 @@
           <a:p>
             <a:fld id="{753845EA-C31C-451A-95A1-ED286AADADFD}" type="datetimeFigureOut">
               <a:rPr lang="es-ES" smtClean="0"/>
-              <a:t>09/04/2022</a:t>
+              <a:t>10/04/2022</a:t>
             </a:fld>
             <a:endParaRPr lang="es-ES"/>
           </a:p>
@@ -4586,7 +5047,7 @@
           <a:p>
             <a:fld id="{753845EA-C31C-451A-95A1-ED286AADADFD}" type="datetimeFigureOut">
               <a:rPr lang="es-ES" smtClean="0"/>
-              <a:t>09/04/2022</a:t>
+              <a:t>10/04/2022</a:t>
             </a:fld>
             <a:endParaRPr lang="es-ES"/>
           </a:p>
@@ -4835,7 +5296,7 @@
           <a:p>
             <a:fld id="{753845EA-C31C-451A-95A1-ED286AADADFD}" type="datetimeFigureOut">
               <a:rPr lang="es-ES" smtClean="0"/>
-              <a:t>09/04/2022</a:t>
+              <a:t>10/04/2022</a:t>
             </a:fld>
             <a:endParaRPr lang="es-ES"/>
           </a:p>
@@ -5092,7 +5553,7 @@
           <a:p>
             <a:fld id="{753845EA-C31C-451A-95A1-ED286AADADFD}" type="datetimeFigureOut">
               <a:rPr lang="es-ES" smtClean="0"/>
-              <a:t>09/04/2022</a:t>
+              <a:t>10/04/2022</a:t>
             </a:fld>
             <a:endParaRPr lang="es-ES"/>
           </a:p>
@@ -5335,7 +5796,7 @@
           <a:p>
             <a:fld id="{753845EA-C31C-451A-95A1-ED286AADADFD}" type="datetimeFigureOut">
               <a:rPr lang="es-ES" smtClean="0"/>
-              <a:t>09/04/2022</a:t>
+              <a:t>10/04/2022</a:t>
             </a:fld>
             <a:endParaRPr lang="es-ES"/>
           </a:p>
@@ -5897,6 +6358,1148 @@
 </p:sld>
 </file>
 
+<file path=ppt/slides/slide10.xml><?xml version="1.0" encoding="utf-8"?>
+<p:sld xmlns:a="http://schemas.openxmlformats.org/drawingml/2006/main" xmlns:r="http://schemas.openxmlformats.org/officeDocument/2006/relationships" xmlns:p="http://schemas.openxmlformats.org/presentationml/2006/main">
+  <p:cSld>
+    <p:spTree>
+      <p:nvGrpSpPr>
+        <p:cNvPr id="1" name=""/>
+        <p:cNvGrpSpPr/>
+        <p:nvPr/>
+      </p:nvGrpSpPr>
+      <p:grpSpPr>
+        <a:xfrm>
+          <a:off x="0" y="0"/>
+          <a:ext cx="0" cy="0"/>
+          <a:chOff x="0" y="0"/>
+          <a:chExt cx="0" cy="0"/>
+        </a:xfrm>
+      </p:grpSpPr>
+      <p:sp>
+        <p:nvSpPr>
+          <p:cNvPr id="3" name="Marcador de contenido 2">
+            <a:extLst>
+              <a:ext uri="{FF2B5EF4-FFF2-40B4-BE49-F238E27FC236}">
+                <a16:creationId xmlns:a16="http://schemas.microsoft.com/office/drawing/2014/main" id="{4770D3B1-E883-47E6-B6C8-6582C076FAA2}"/>
+              </a:ext>
+            </a:extLst>
+          </p:cNvPr>
+          <p:cNvSpPr>
+            <a:spLocks noGrp="1"/>
+          </p:cNvSpPr>
+          <p:nvPr>
+            <p:ph idx="1"/>
+          </p:nvPr>
+        </p:nvSpPr>
+        <p:spPr>
+          <a:xfrm>
+            <a:off x="0" y="0"/>
+            <a:ext cx="12192000" cy="6858000"/>
+          </a:xfrm>
+        </p:spPr>
+        <p:txBody>
+          <a:bodyPr>
+            <a:normAutofit/>
+          </a:bodyPr>
+          <a:lstStyle/>
+          <a:p>
+            <a:pPr marL="0" indent="0">
+              <a:buNone/>
+            </a:pPr>
+            <a:r>
+              <a:rPr lang="es-ES" sz="3600" b="1" dirty="0" err="1"/>
+              <a:t>Formulari</a:t>
+            </a:r>
+            <a:r>
+              <a:rPr lang="es-ES" sz="3600" b="1" dirty="0"/>
+              <a:t> i taula </a:t>
+            </a:r>
+            <a:r>
+              <a:rPr lang="es-ES" sz="3600" b="1" dirty="0" err="1"/>
+              <a:t>empleats</a:t>
+            </a:r>
+            <a:r>
+              <a:rPr lang="es-ES" sz="3600" b="1" dirty="0"/>
+              <a:t>:</a:t>
+            </a:r>
+          </a:p>
+        </p:txBody>
+      </p:sp>
+      <p:pic>
+        <p:nvPicPr>
+          <p:cNvPr id="5" name="Imagen 4">
+            <a:extLst>
+              <a:ext uri="{FF2B5EF4-FFF2-40B4-BE49-F238E27FC236}">
+                <a16:creationId xmlns:a16="http://schemas.microsoft.com/office/drawing/2014/main" id="{107738F1-5B20-4C5A-9CFC-075C6BEAEEDB}"/>
+              </a:ext>
+            </a:extLst>
+          </p:cNvPr>
+          <p:cNvPicPr>
+            <a:picLocks noChangeAspect="1"/>
+          </p:cNvPicPr>
+          <p:nvPr/>
+        </p:nvPicPr>
+        <p:blipFill>
+          <a:blip r:embed="rId2"/>
+          <a:stretch>
+            <a:fillRect/>
+          </a:stretch>
+        </p:blipFill>
+        <p:spPr>
+          <a:xfrm>
+            <a:off x="0" y="506187"/>
+            <a:ext cx="12191999" cy="6351814"/>
+          </a:xfrm>
+          <a:prstGeom prst="rect">
+            <a:avLst/>
+          </a:prstGeom>
+        </p:spPr>
+      </p:pic>
+    </p:spTree>
+    <p:extLst>
+      <p:ext uri="{BB962C8B-B14F-4D97-AF65-F5344CB8AC3E}">
+        <p14:creationId xmlns:p14="http://schemas.microsoft.com/office/powerpoint/2010/main" val="878808329"/>
+      </p:ext>
+    </p:extLst>
+  </p:cSld>
+  <p:clrMapOvr>
+    <a:masterClrMapping/>
+  </p:clrMapOvr>
+</p:sld>
+</file>
+
+<file path=ppt/slides/slide11.xml><?xml version="1.0" encoding="utf-8"?>
+<p:sld xmlns:a="http://schemas.openxmlformats.org/drawingml/2006/main" xmlns:r="http://schemas.openxmlformats.org/officeDocument/2006/relationships" xmlns:p="http://schemas.openxmlformats.org/presentationml/2006/main">
+  <p:cSld>
+    <p:spTree>
+      <p:nvGrpSpPr>
+        <p:cNvPr id="1" name=""/>
+        <p:cNvGrpSpPr/>
+        <p:nvPr/>
+      </p:nvGrpSpPr>
+      <p:grpSpPr>
+        <a:xfrm>
+          <a:off x="0" y="0"/>
+          <a:ext cx="0" cy="0"/>
+          <a:chOff x="0" y="0"/>
+          <a:chExt cx="0" cy="0"/>
+        </a:xfrm>
+      </p:grpSpPr>
+      <p:sp>
+        <p:nvSpPr>
+          <p:cNvPr id="3" name="Marcador de contenido 2">
+            <a:extLst>
+              <a:ext uri="{FF2B5EF4-FFF2-40B4-BE49-F238E27FC236}">
+                <a16:creationId xmlns:a16="http://schemas.microsoft.com/office/drawing/2014/main" id="{D0E1986A-8FD8-4482-B427-BC43C07209B5}"/>
+              </a:ext>
+            </a:extLst>
+          </p:cNvPr>
+          <p:cNvSpPr>
+            <a:spLocks noGrp="1"/>
+          </p:cNvSpPr>
+          <p:nvPr>
+            <p:ph idx="1"/>
+          </p:nvPr>
+        </p:nvSpPr>
+        <p:spPr>
+          <a:xfrm>
+            <a:off x="0" y="0"/>
+            <a:ext cx="12192000" cy="6858000"/>
+          </a:xfrm>
+        </p:spPr>
+        <p:txBody>
+          <a:bodyPr>
+            <a:normAutofit/>
+          </a:bodyPr>
+          <a:lstStyle/>
+          <a:p>
+            <a:pPr marL="0" indent="0">
+              <a:buNone/>
+            </a:pPr>
+            <a:r>
+              <a:rPr lang="es-ES" sz="3600" b="1" dirty="0" err="1"/>
+              <a:t>Formulari</a:t>
+            </a:r>
+            <a:r>
+              <a:rPr lang="es-ES" sz="3600" b="1" dirty="0"/>
+              <a:t> i taula </a:t>
+            </a:r>
+            <a:r>
+              <a:rPr lang="es-ES" sz="3600" b="1" dirty="0" err="1"/>
+              <a:t>sociis</a:t>
+            </a:r>
+            <a:r>
+              <a:rPr lang="es-ES" sz="3600" b="1" dirty="0"/>
+              <a:t>:</a:t>
+            </a:r>
+          </a:p>
+        </p:txBody>
+      </p:sp>
+      <p:pic>
+        <p:nvPicPr>
+          <p:cNvPr id="5" name="Imagen 4">
+            <a:extLst>
+              <a:ext uri="{FF2B5EF4-FFF2-40B4-BE49-F238E27FC236}">
+                <a16:creationId xmlns:a16="http://schemas.microsoft.com/office/drawing/2014/main" id="{2EE1538A-1E7A-4E0F-9C04-7BF57A61BBD0}"/>
+              </a:ext>
+            </a:extLst>
+          </p:cNvPr>
+          <p:cNvPicPr>
+            <a:picLocks noChangeAspect="1"/>
+          </p:cNvPicPr>
+          <p:nvPr/>
+        </p:nvPicPr>
+        <p:blipFill>
+          <a:blip r:embed="rId2"/>
+          <a:stretch>
+            <a:fillRect/>
+          </a:stretch>
+        </p:blipFill>
+        <p:spPr>
+          <a:xfrm>
+            <a:off x="0" y="473529"/>
+            <a:ext cx="12191999" cy="6384471"/>
+          </a:xfrm>
+          <a:prstGeom prst="rect">
+            <a:avLst/>
+          </a:prstGeom>
+        </p:spPr>
+      </p:pic>
+    </p:spTree>
+    <p:extLst>
+      <p:ext uri="{BB962C8B-B14F-4D97-AF65-F5344CB8AC3E}">
+        <p14:creationId xmlns:p14="http://schemas.microsoft.com/office/powerpoint/2010/main" val="3313657756"/>
+      </p:ext>
+    </p:extLst>
+  </p:cSld>
+  <p:clrMapOvr>
+    <a:masterClrMapping/>
+  </p:clrMapOvr>
+</p:sld>
+</file>
+
+<file path=ppt/slides/slide12.xml><?xml version="1.0" encoding="utf-8"?>
+<p:sld xmlns:a="http://schemas.openxmlformats.org/drawingml/2006/main" xmlns:r="http://schemas.openxmlformats.org/officeDocument/2006/relationships" xmlns:p="http://schemas.openxmlformats.org/presentationml/2006/main">
+  <p:cSld>
+    <p:spTree>
+      <p:nvGrpSpPr>
+        <p:cNvPr id="1" name=""/>
+        <p:cNvGrpSpPr/>
+        <p:nvPr/>
+      </p:nvGrpSpPr>
+      <p:grpSpPr>
+        <a:xfrm>
+          <a:off x="0" y="0"/>
+          <a:ext cx="0" cy="0"/>
+          <a:chOff x="0" y="0"/>
+          <a:chExt cx="0" cy="0"/>
+        </a:xfrm>
+      </p:grpSpPr>
+      <p:sp>
+        <p:nvSpPr>
+          <p:cNvPr id="2" name="Título 1">
+            <a:extLst>
+              <a:ext uri="{FF2B5EF4-FFF2-40B4-BE49-F238E27FC236}">
+                <a16:creationId xmlns:a16="http://schemas.microsoft.com/office/drawing/2014/main" id="{E4B51B09-D8DE-4D14-B672-912DF51E2319}"/>
+              </a:ext>
+            </a:extLst>
+          </p:cNvPr>
+          <p:cNvSpPr>
+            <a:spLocks noGrp="1"/>
+          </p:cNvSpPr>
+          <p:nvPr>
+            <p:ph type="title"/>
+          </p:nvPr>
+        </p:nvSpPr>
+        <p:spPr>
+          <a:xfrm>
+            <a:off x="1790700" y="-7199"/>
+            <a:ext cx="8610600" cy="646514"/>
+          </a:xfrm>
+        </p:spPr>
+        <p:txBody>
+          <a:bodyPr>
+            <a:normAutofit fontScale="90000"/>
+          </a:bodyPr>
+          <a:lstStyle/>
+          <a:p>
+            <a:pPr algn="ctr"/>
+            <a:r>
+              <a:rPr lang="es-ES" sz="4400" b="1" dirty="0"/>
+              <a:t>Base de dades</a:t>
+            </a:r>
+          </a:p>
+        </p:txBody>
+      </p:sp>
+      <p:sp>
+        <p:nvSpPr>
+          <p:cNvPr id="3" name="Marcador de contenido 2">
+            <a:extLst>
+              <a:ext uri="{FF2B5EF4-FFF2-40B4-BE49-F238E27FC236}">
+                <a16:creationId xmlns:a16="http://schemas.microsoft.com/office/drawing/2014/main" id="{CAA27DC1-C294-494C-8EDC-DB0344714725}"/>
+              </a:ext>
+            </a:extLst>
+          </p:cNvPr>
+          <p:cNvSpPr>
+            <a:spLocks noGrp="1"/>
+          </p:cNvSpPr>
+          <p:nvPr>
+            <p:ph idx="1"/>
+          </p:nvPr>
+        </p:nvSpPr>
+        <p:spPr>
+          <a:xfrm>
+            <a:off x="0" y="829011"/>
+            <a:ext cx="12192000" cy="6028989"/>
+          </a:xfrm>
+        </p:spPr>
+        <p:txBody>
+          <a:bodyPr>
+            <a:normAutofit/>
+          </a:bodyPr>
+          <a:lstStyle/>
+          <a:p>
+            <a:pPr marL="0" indent="0">
+              <a:buNone/>
+            </a:pPr>
+            <a:r>
+              <a:rPr lang="es-ES" sz="3200" b="1" dirty="0"/>
+              <a:t>Taula </a:t>
+            </a:r>
+            <a:r>
+              <a:rPr lang="es-ES" sz="3200" b="1" dirty="0" err="1"/>
+              <a:t>clients</a:t>
+            </a:r>
+            <a:r>
+              <a:rPr lang="es-ES" sz="3200" b="1" dirty="0"/>
+              <a:t>:</a:t>
+            </a:r>
+          </a:p>
+        </p:txBody>
+      </p:sp>
+      <p:pic>
+        <p:nvPicPr>
+          <p:cNvPr id="5" name="Imagen 4">
+            <a:extLst>
+              <a:ext uri="{FF2B5EF4-FFF2-40B4-BE49-F238E27FC236}">
+                <a16:creationId xmlns:a16="http://schemas.microsoft.com/office/drawing/2014/main" id="{17449C21-656B-4390-A1E4-4988BB83D1EF}"/>
+              </a:ext>
+            </a:extLst>
+          </p:cNvPr>
+          <p:cNvPicPr>
+            <a:picLocks noChangeAspect="1"/>
+          </p:cNvPicPr>
+          <p:nvPr/>
+        </p:nvPicPr>
+        <p:blipFill>
+          <a:blip r:embed="rId2"/>
+          <a:stretch>
+            <a:fillRect/>
+          </a:stretch>
+        </p:blipFill>
+        <p:spPr>
+          <a:xfrm>
+            <a:off x="0" y="1273629"/>
+            <a:ext cx="12192000" cy="5584371"/>
+          </a:xfrm>
+          <a:prstGeom prst="rect">
+            <a:avLst/>
+          </a:prstGeom>
+        </p:spPr>
+      </p:pic>
+    </p:spTree>
+    <p:extLst>
+      <p:ext uri="{BB962C8B-B14F-4D97-AF65-F5344CB8AC3E}">
+        <p14:creationId xmlns:p14="http://schemas.microsoft.com/office/powerpoint/2010/main" val="1143013689"/>
+      </p:ext>
+    </p:extLst>
+  </p:cSld>
+  <p:clrMapOvr>
+    <a:masterClrMapping/>
+  </p:clrMapOvr>
+</p:sld>
+</file>
+
+<file path=ppt/slides/slide13.xml><?xml version="1.0" encoding="utf-8"?>
+<p:sld xmlns:a="http://schemas.openxmlformats.org/drawingml/2006/main" xmlns:r="http://schemas.openxmlformats.org/officeDocument/2006/relationships" xmlns:p="http://schemas.openxmlformats.org/presentationml/2006/main">
+  <p:cSld>
+    <p:spTree>
+      <p:nvGrpSpPr>
+        <p:cNvPr id="1" name=""/>
+        <p:cNvGrpSpPr/>
+        <p:nvPr/>
+      </p:nvGrpSpPr>
+      <p:grpSpPr>
+        <a:xfrm>
+          <a:off x="0" y="0"/>
+          <a:ext cx="0" cy="0"/>
+          <a:chOff x="0" y="0"/>
+          <a:chExt cx="0" cy="0"/>
+        </a:xfrm>
+      </p:grpSpPr>
+      <p:sp>
+        <p:nvSpPr>
+          <p:cNvPr id="3" name="Marcador de contenido 2">
+            <a:extLst>
+              <a:ext uri="{FF2B5EF4-FFF2-40B4-BE49-F238E27FC236}">
+                <a16:creationId xmlns:a16="http://schemas.microsoft.com/office/drawing/2014/main" id="{0915F7D3-169A-47A6-8EB8-5449B0BF6E58}"/>
+              </a:ext>
+            </a:extLst>
+          </p:cNvPr>
+          <p:cNvSpPr>
+            <a:spLocks noGrp="1"/>
+          </p:cNvSpPr>
+          <p:nvPr>
+            <p:ph idx="1"/>
+          </p:nvPr>
+        </p:nvSpPr>
+        <p:spPr>
+          <a:xfrm>
+            <a:off x="0" y="39189"/>
+            <a:ext cx="12192000" cy="6818811"/>
+          </a:xfrm>
+        </p:spPr>
+        <p:txBody>
+          <a:bodyPr>
+            <a:normAutofit/>
+          </a:bodyPr>
+          <a:lstStyle/>
+          <a:p>
+            <a:pPr marL="0" indent="0">
+              <a:buNone/>
+            </a:pPr>
+            <a:r>
+              <a:rPr lang="es-ES" sz="3200" b="1" dirty="0"/>
+              <a:t>Taula </a:t>
+            </a:r>
+            <a:r>
+              <a:rPr lang="es-ES" sz="3200" b="1" dirty="0" err="1"/>
+              <a:t>empleats</a:t>
+            </a:r>
+            <a:r>
+              <a:rPr lang="es-ES" sz="3200" b="1" dirty="0"/>
+              <a:t>:</a:t>
+            </a:r>
+          </a:p>
+        </p:txBody>
+      </p:sp>
+      <p:pic>
+        <p:nvPicPr>
+          <p:cNvPr id="5" name="Imagen 4">
+            <a:extLst>
+              <a:ext uri="{FF2B5EF4-FFF2-40B4-BE49-F238E27FC236}">
+                <a16:creationId xmlns:a16="http://schemas.microsoft.com/office/drawing/2014/main" id="{156DA994-734F-4964-BE91-76D80899FF5E}"/>
+              </a:ext>
+            </a:extLst>
+          </p:cNvPr>
+          <p:cNvPicPr>
+            <a:picLocks noChangeAspect="1"/>
+          </p:cNvPicPr>
+          <p:nvPr/>
+        </p:nvPicPr>
+        <p:blipFill>
+          <a:blip r:embed="rId2"/>
+          <a:stretch>
+            <a:fillRect/>
+          </a:stretch>
+        </p:blipFill>
+        <p:spPr>
+          <a:xfrm>
+            <a:off x="0" y="506185"/>
+            <a:ext cx="12192000" cy="6351815"/>
+          </a:xfrm>
+          <a:prstGeom prst="rect">
+            <a:avLst/>
+          </a:prstGeom>
+        </p:spPr>
+      </p:pic>
+    </p:spTree>
+    <p:extLst>
+      <p:ext uri="{BB962C8B-B14F-4D97-AF65-F5344CB8AC3E}">
+        <p14:creationId xmlns:p14="http://schemas.microsoft.com/office/powerpoint/2010/main" val="1357926933"/>
+      </p:ext>
+    </p:extLst>
+  </p:cSld>
+  <p:clrMapOvr>
+    <a:masterClrMapping/>
+  </p:clrMapOvr>
+</p:sld>
+</file>
+
+<file path=ppt/slides/slide14.xml><?xml version="1.0" encoding="utf-8"?>
+<p:sld xmlns:a="http://schemas.openxmlformats.org/drawingml/2006/main" xmlns:r="http://schemas.openxmlformats.org/officeDocument/2006/relationships" xmlns:p="http://schemas.openxmlformats.org/presentationml/2006/main">
+  <p:cSld>
+    <p:spTree>
+      <p:nvGrpSpPr>
+        <p:cNvPr id="1" name=""/>
+        <p:cNvGrpSpPr/>
+        <p:nvPr/>
+      </p:nvGrpSpPr>
+      <p:grpSpPr>
+        <a:xfrm>
+          <a:off x="0" y="0"/>
+          <a:ext cx="0" cy="0"/>
+          <a:chOff x="0" y="0"/>
+          <a:chExt cx="0" cy="0"/>
+        </a:xfrm>
+      </p:grpSpPr>
+      <p:sp>
+        <p:nvSpPr>
+          <p:cNvPr id="3" name="Marcador de contenido 2">
+            <a:extLst>
+              <a:ext uri="{FF2B5EF4-FFF2-40B4-BE49-F238E27FC236}">
+                <a16:creationId xmlns:a16="http://schemas.microsoft.com/office/drawing/2014/main" id="{F924C19C-FEA6-4F3C-8072-137858C88C97}"/>
+              </a:ext>
+            </a:extLst>
+          </p:cNvPr>
+          <p:cNvSpPr>
+            <a:spLocks noGrp="1"/>
+          </p:cNvSpPr>
+          <p:nvPr>
+            <p:ph idx="1"/>
+          </p:nvPr>
+        </p:nvSpPr>
+        <p:spPr>
+          <a:xfrm>
+            <a:off x="0" y="0"/>
+            <a:ext cx="12192000" cy="6858000"/>
+          </a:xfrm>
+        </p:spPr>
+        <p:txBody>
+          <a:bodyPr>
+            <a:normAutofit/>
+          </a:bodyPr>
+          <a:lstStyle/>
+          <a:p>
+            <a:pPr marL="0" indent="0">
+              <a:buNone/>
+            </a:pPr>
+            <a:r>
+              <a:rPr lang="es-ES" sz="3200" b="1" dirty="0"/>
+              <a:t>Taula </a:t>
+            </a:r>
+            <a:r>
+              <a:rPr lang="es-ES" sz="3200" b="1" dirty="0" err="1"/>
+              <a:t>sociis</a:t>
+            </a:r>
+            <a:r>
+              <a:rPr lang="es-ES" sz="3200" b="1" dirty="0"/>
+              <a:t>:</a:t>
+            </a:r>
+          </a:p>
+        </p:txBody>
+      </p:sp>
+      <p:pic>
+        <p:nvPicPr>
+          <p:cNvPr id="5" name="Imagen 4">
+            <a:extLst>
+              <a:ext uri="{FF2B5EF4-FFF2-40B4-BE49-F238E27FC236}">
+                <a16:creationId xmlns:a16="http://schemas.microsoft.com/office/drawing/2014/main" id="{499EE996-2BE7-4D19-9E76-9E46C7CA29BF}"/>
+              </a:ext>
+            </a:extLst>
+          </p:cNvPr>
+          <p:cNvPicPr>
+            <a:picLocks noChangeAspect="1"/>
+          </p:cNvPicPr>
+          <p:nvPr/>
+        </p:nvPicPr>
+        <p:blipFill>
+          <a:blip r:embed="rId2"/>
+          <a:stretch>
+            <a:fillRect/>
+          </a:stretch>
+        </p:blipFill>
+        <p:spPr>
+          <a:xfrm>
+            <a:off x="0" y="440871"/>
+            <a:ext cx="12192000" cy="6417129"/>
+          </a:xfrm>
+          <a:prstGeom prst="rect">
+            <a:avLst/>
+          </a:prstGeom>
+        </p:spPr>
+      </p:pic>
+    </p:spTree>
+    <p:extLst>
+      <p:ext uri="{BB962C8B-B14F-4D97-AF65-F5344CB8AC3E}">
+        <p14:creationId xmlns:p14="http://schemas.microsoft.com/office/powerpoint/2010/main" val="1223059365"/>
+      </p:ext>
+    </p:extLst>
+  </p:cSld>
+  <p:clrMapOvr>
+    <a:masterClrMapping/>
+  </p:clrMapOvr>
+</p:sld>
+</file>
+
+<file path=ppt/slides/slide15.xml><?xml version="1.0" encoding="utf-8"?>
+<p:sld xmlns:a="http://schemas.openxmlformats.org/drawingml/2006/main" xmlns:r="http://schemas.openxmlformats.org/officeDocument/2006/relationships" xmlns:p="http://schemas.openxmlformats.org/presentationml/2006/main">
+  <p:cSld>
+    <p:spTree>
+      <p:nvGrpSpPr>
+        <p:cNvPr id="1" name=""/>
+        <p:cNvGrpSpPr/>
+        <p:nvPr/>
+      </p:nvGrpSpPr>
+      <p:grpSpPr>
+        <a:xfrm>
+          <a:off x="0" y="0"/>
+          <a:ext cx="0" cy="0"/>
+          <a:chOff x="0" y="0"/>
+          <a:chExt cx="0" cy="0"/>
+        </a:xfrm>
+      </p:grpSpPr>
+      <p:sp>
+        <p:nvSpPr>
+          <p:cNvPr id="2" name="Título 1">
+            <a:extLst>
+              <a:ext uri="{FF2B5EF4-FFF2-40B4-BE49-F238E27FC236}">
+                <a16:creationId xmlns:a16="http://schemas.microsoft.com/office/drawing/2014/main" id="{238A5A6B-7194-41FA-87A1-343F3636837F}"/>
+              </a:ext>
+            </a:extLst>
+          </p:cNvPr>
+          <p:cNvSpPr>
+            <a:spLocks noGrp="1"/>
+          </p:cNvSpPr>
+          <p:nvPr>
+            <p:ph type="title"/>
+          </p:nvPr>
+        </p:nvSpPr>
+        <p:spPr>
+          <a:xfrm>
+            <a:off x="1790700" y="0"/>
+            <a:ext cx="8610600" cy="639315"/>
+          </a:xfrm>
+        </p:spPr>
+        <p:txBody>
+          <a:bodyPr>
+            <a:normAutofit fontScale="90000"/>
+          </a:bodyPr>
+          <a:lstStyle/>
+          <a:p>
+            <a:pPr algn="ctr"/>
+            <a:r>
+              <a:rPr lang="es-ES" sz="4400" b="1" dirty="0"/>
+              <a:t>MOCKUP I PROTOTIP</a:t>
+            </a:r>
+          </a:p>
+        </p:txBody>
+      </p:sp>
+      <p:sp>
+        <p:nvSpPr>
+          <p:cNvPr id="3" name="Marcador de contenido 2">
+            <a:extLst>
+              <a:ext uri="{FF2B5EF4-FFF2-40B4-BE49-F238E27FC236}">
+                <a16:creationId xmlns:a16="http://schemas.microsoft.com/office/drawing/2014/main" id="{68F8EE4C-A4EB-4F0A-B5F8-6EE09AEF9923}"/>
+              </a:ext>
+            </a:extLst>
+          </p:cNvPr>
+          <p:cNvSpPr>
+            <a:spLocks noGrp="1"/>
+          </p:cNvSpPr>
+          <p:nvPr>
+            <p:ph idx="1"/>
+          </p:nvPr>
+        </p:nvSpPr>
+        <p:spPr>
+          <a:xfrm>
+            <a:off x="0" y="639315"/>
+            <a:ext cx="12192000" cy="6218685"/>
+          </a:xfrm>
+        </p:spPr>
+        <p:txBody>
+          <a:bodyPr>
+            <a:normAutofit/>
+          </a:bodyPr>
+          <a:lstStyle/>
+          <a:p>
+            <a:r>
+              <a:rPr lang="es-ES" sz="3600" b="1" dirty="0"/>
+              <a:t>Pagina Principal.</a:t>
+            </a:r>
+          </a:p>
+          <a:p>
+            <a:r>
+              <a:rPr lang="es-ES" sz="3600" b="1" dirty="0"/>
+              <a:t>Quienes Somos.</a:t>
+            </a:r>
+          </a:p>
+          <a:p>
+            <a:r>
+              <a:rPr lang="es-ES" sz="3600" b="1" dirty="0"/>
+              <a:t>Viabilidad y Marketing.</a:t>
+            </a:r>
+          </a:p>
+          <a:p>
+            <a:r>
+              <a:rPr lang="es-ES" sz="3600" b="1" dirty="0"/>
+              <a:t>Historia de la Humanidad.</a:t>
+            </a:r>
+          </a:p>
+          <a:p>
+            <a:pPr lvl="1"/>
+            <a:r>
+              <a:rPr lang="es-ES" sz="3600" b="1" dirty="0"/>
+              <a:t>Historia de Egipto.</a:t>
+            </a:r>
+          </a:p>
+          <a:p>
+            <a:pPr lvl="1"/>
+            <a:r>
+              <a:rPr lang="es-ES" sz="3600" b="1" dirty="0"/>
+              <a:t>Historia de Grecia.</a:t>
+            </a:r>
+          </a:p>
+          <a:p>
+            <a:pPr lvl="1"/>
+            <a:r>
+              <a:rPr lang="es-ES" sz="3600" b="1" dirty="0"/>
+              <a:t>Historia de </a:t>
+            </a:r>
+            <a:r>
+              <a:rPr lang="es-ES" sz="3600" b="1" dirty="0" err="1"/>
+              <a:t>Latinoamerica</a:t>
+            </a:r>
+            <a:r>
+              <a:rPr lang="es-ES" sz="3600" b="1" dirty="0"/>
+              <a:t>.</a:t>
+            </a:r>
+          </a:p>
+          <a:p>
+            <a:pPr lvl="2"/>
+            <a:r>
+              <a:rPr lang="es-ES" sz="3200" b="1" dirty="0"/>
+              <a:t>Historia Azteca.</a:t>
+            </a:r>
+          </a:p>
+          <a:p>
+            <a:pPr lvl="2"/>
+            <a:r>
+              <a:rPr lang="es-ES" sz="3200" b="1" dirty="0"/>
+              <a:t>Historia Inca.</a:t>
+            </a:r>
+          </a:p>
+          <a:p>
+            <a:pPr lvl="2"/>
+            <a:r>
+              <a:rPr lang="es-ES" sz="3200" b="1" dirty="0"/>
+              <a:t>Historia Maya.</a:t>
+            </a:r>
+          </a:p>
+          <a:p>
+            <a:pPr lvl="1"/>
+            <a:r>
+              <a:rPr lang="es-ES" sz="3600" b="1" dirty="0"/>
+              <a:t>Historia </a:t>
+            </a:r>
+            <a:r>
+              <a:rPr lang="es-ES" sz="3600" b="1" dirty="0" err="1"/>
+              <a:t>Nordica</a:t>
+            </a:r>
+            <a:r>
+              <a:rPr lang="es-ES" sz="3600" b="1" dirty="0"/>
+              <a:t>.</a:t>
+            </a:r>
+          </a:p>
+        </p:txBody>
+      </p:sp>
+    </p:spTree>
+    <p:extLst>
+      <p:ext uri="{BB962C8B-B14F-4D97-AF65-F5344CB8AC3E}">
+        <p14:creationId xmlns:p14="http://schemas.microsoft.com/office/powerpoint/2010/main" val="1029182182"/>
+      </p:ext>
+    </p:extLst>
+  </p:cSld>
+  <p:clrMapOvr>
+    <a:masterClrMapping/>
+  </p:clrMapOvr>
+</p:sld>
+</file>
+
+<file path=ppt/slides/slide16.xml><?xml version="1.0" encoding="utf-8"?>
+<p:sld xmlns:a="http://schemas.openxmlformats.org/drawingml/2006/main" xmlns:r="http://schemas.openxmlformats.org/officeDocument/2006/relationships" xmlns:p="http://schemas.openxmlformats.org/presentationml/2006/main">
+  <p:cSld>
+    <p:spTree>
+      <p:nvGrpSpPr>
+        <p:cNvPr id="1" name=""/>
+        <p:cNvGrpSpPr/>
+        <p:nvPr/>
+      </p:nvGrpSpPr>
+      <p:grpSpPr>
+        <a:xfrm>
+          <a:off x="0" y="0"/>
+          <a:ext cx="0" cy="0"/>
+          <a:chOff x="0" y="0"/>
+          <a:chExt cx="0" cy="0"/>
+        </a:xfrm>
+      </p:grpSpPr>
+      <p:sp>
+        <p:nvSpPr>
+          <p:cNvPr id="2" name="Título 1">
+            <a:extLst>
+              <a:ext uri="{FF2B5EF4-FFF2-40B4-BE49-F238E27FC236}">
+                <a16:creationId xmlns:a16="http://schemas.microsoft.com/office/drawing/2014/main" id="{1084BBE1-A7C8-4B51-974D-4913255554FA}"/>
+              </a:ext>
+            </a:extLst>
+          </p:cNvPr>
+          <p:cNvSpPr>
+            <a:spLocks noGrp="1"/>
+          </p:cNvSpPr>
+          <p:nvPr>
+            <p:ph type="title"/>
+          </p:nvPr>
+        </p:nvSpPr>
+        <p:spPr>
+          <a:xfrm>
+            <a:off x="1790700" y="0"/>
+            <a:ext cx="8610600" cy="522514"/>
+          </a:xfrm>
+        </p:spPr>
+        <p:txBody>
+          <a:bodyPr>
+            <a:normAutofit fontScale="90000"/>
+          </a:bodyPr>
+          <a:lstStyle/>
+          <a:p>
+            <a:pPr algn="ctr"/>
+            <a:r>
+              <a:rPr lang="es-ES" b="1" dirty="0"/>
+              <a:t>Pagina PRINCIPAL</a:t>
+            </a:r>
+          </a:p>
+        </p:txBody>
+      </p:sp>
+      <p:pic>
+        <p:nvPicPr>
+          <p:cNvPr id="5" name="Imagen 4">
+            <a:extLst>
+              <a:ext uri="{FF2B5EF4-FFF2-40B4-BE49-F238E27FC236}">
+                <a16:creationId xmlns:a16="http://schemas.microsoft.com/office/drawing/2014/main" id="{BB2F975C-6511-4B2C-9D60-1355C31EF388}"/>
+              </a:ext>
+            </a:extLst>
+          </p:cNvPr>
+          <p:cNvPicPr>
+            <a:picLocks noChangeAspect="1"/>
+          </p:cNvPicPr>
+          <p:nvPr/>
+        </p:nvPicPr>
+        <p:blipFill>
+          <a:blip r:embed="rId2"/>
+          <a:stretch>
+            <a:fillRect/>
+          </a:stretch>
+        </p:blipFill>
+        <p:spPr>
+          <a:xfrm>
+            <a:off x="0" y="522514"/>
+            <a:ext cx="12192000" cy="6335486"/>
+          </a:xfrm>
+          <a:prstGeom prst="rect">
+            <a:avLst/>
+          </a:prstGeom>
+        </p:spPr>
+      </p:pic>
+    </p:spTree>
+    <p:extLst>
+      <p:ext uri="{BB962C8B-B14F-4D97-AF65-F5344CB8AC3E}">
+        <p14:creationId xmlns:p14="http://schemas.microsoft.com/office/powerpoint/2010/main" val="3595697555"/>
+      </p:ext>
+    </p:extLst>
+  </p:cSld>
+  <p:clrMapOvr>
+    <a:masterClrMapping/>
+  </p:clrMapOvr>
+</p:sld>
+</file>
+
+<file path=ppt/slides/slide17.xml><?xml version="1.0" encoding="utf-8"?>
+<p:sld xmlns:a="http://schemas.openxmlformats.org/drawingml/2006/main" xmlns:r="http://schemas.openxmlformats.org/officeDocument/2006/relationships" xmlns:p="http://schemas.openxmlformats.org/presentationml/2006/main">
+  <p:cSld>
+    <p:spTree>
+      <p:nvGrpSpPr>
+        <p:cNvPr id="1" name=""/>
+        <p:cNvGrpSpPr/>
+        <p:nvPr/>
+      </p:nvGrpSpPr>
+      <p:grpSpPr>
+        <a:xfrm>
+          <a:off x="0" y="0"/>
+          <a:ext cx="0" cy="0"/>
+          <a:chOff x="0" y="0"/>
+          <a:chExt cx="0" cy="0"/>
+        </a:xfrm>
+      </p:grpSpPr>
+      <p:sp>
+        <p:nvSpPr>
+          <p:cNvPr id="2" name="Título 1">
+            <a:extLst>
+              <a:ext uri="{FF2B5EF4-FFF2-40B4-BE49-F238E27FC236}">
+                <a16:creationId xmlns:a16="http://schemas.microsoft.com/office/drawing/2014/main" id="{1084BBE1-A7C8-4B51-974D-4913255554FA}"/>
+              </a:ext>
+            </a:extLst>
+          </p:cNvPr>
+          <p:cNvSpPr>
+            <a:spLocks noGrp="1"/>
+          </p:cNvSpPr>
+          <p:nvPr>
+            <p:ph type="title"/>
+          </p:nvPr>
+        </p:nvSpPr>
+        <p:spPr>
+          <a:xfrm>
+            <a:off x="1790700" y="0"/>
+            <a:ext cx="8610600" cy="522514"/>
+          </a:xfrm>
+        </p:spPr>
+        <p:txBody>
+          <a:bodyPr>
+            <a:normAutofit fontScale="90000"/>
+          </a:bodyPr>
+          <a:lstStyle/>
+          <a:p>
+            <a:pPr algn="ctr"/>
+            <a:r>
+              <a:rPr lang="es-ES" b="1" dirty="0"/>
+              <a:t>Quienes SOMOS</a:t>
+            </a:r>
+          </a:p>
+        </p:txBody>
+      </p:sp>
+      <p:pic>
+        <p:nvPicPr>
+          <p:cNvPr id="7" name="Imagen 6">
+            <a:extLst>
+              <a:ext uri="{FF2B5EF4-FFF2-40B4-BE49-F238E27FC236}">
+                <a16:creationId xmlns:a16="http://schemas.microsoft.com/office/drawing/2014/main" id="{D87F7802-9423-4202-940C-43DE68DAE207}"/>
+              </a:ext>
+            </a:extLst>
+          </p:cNvPr>
+          <p:cNvPicPr>
+            <a:picLocks noChangeAspect="1"/>
+          </p:cNvPicPr>
+          <p:nvPr/>
+        </p:nvPicPr>
+        <p:blipFill>
+          <a:blip r:embed="rId2"/>
+          <a:stretch>
+            <a:fillRect/>
+          </a:stretch>
+        </p:blipFill>
+        <p:spPr>
+          <a:xfrm>
+            <a:off x="0" y="522514"/>
+            <a:ext cx="12191999" cy="6335486"/>
+          </a:xfrm>
+          <a:prstGeom prst="rect">
+            <a:avLst/>
+          </a:prstGeom>
+        </p:spPr>
+      </p:pic>
+    </p:spTree>
+    <p:extLst>
+      <p:ext uri="{BB962C8B-B14F-4D97-AF65-F5344CB8AC3E}">
+        <p14:creationId xmlns:p14="http://schemas.microsoft.com/office/powerpoint/2010/main" val="1565375743"/>
+      </p:ext>
+    </p:extLst>
+  </p:cSld>
+  <p:clrMapOvr>
+    <a:masterClrMapping/>
+  </p:clrMapOvr>
+</p:sld>
+</file>
+
+<file path=ppt/slides/slide18.xml><?xml version="1.0" encoding="utf-8"?>
+<p:sld xmlns:a="http://schemas.openxmlformats.org/drawingml/2006/main" xmlns:r="http://schemas.openxmlformats.org/officeDocument/2006/relationships" xmlns:p="http://schemas.openxmlformats.org/presentationml/2006/main">
+  <p:cSld>
+    <p:spTree>
+      <p:nvGrpSpPr>
+        <p:cNvPr id="1" name=""/>
+        <p:cNvGrpSpPr/>
+        <p:nvPr/>
+      </p:nvGrpSpPr>
+      <p:grpSpPr>
+        <a:xfrm>
+          <a:off x="0" y="0"/>
+          <a:ext cx="0" cy="0"/>
+          <a:chOff x="0" y="0"/>
+          <a:chExt cx="0" cy="0"/>
+        </a:xfrm>
+      </p:grpSpPr>
+      <p:sp>
+        <p:nvSpPr>
+          <p:cNvPr id="2" name="Título 1">
+            <a:extLst>
+              <a:ext uri="{FF2B5EF4-FFF2-40B4-BE49-F238E27FC236}">
+                <a16:creationId xmlns:a16="http://schemas.microsoft.com/office/drawing/2014/main" id="{1084BBE1-A7C8-4B51-974D-4913255554FA}"/>
+              </a:ext>
+            </a:extLst>
+          </p:cNvPr>
+          <p:cNvSpPr>
+            <a:spLocks noGrp="1"/>
+          </p:cNvSpPr>
+          <p:nvPr>
+            <p:ph type="title"/>
+          </p:nvPr>
+        </p:nvSpPr>
+        <p:spPr>
+          <a:xfrm>
+            <a:off x="1790700" y="0"/>
+            <a:ext cx="8610600" cy="522514"/>
+          </a:xfrm>
+        </p:spPr>
+        <p:txBody>
+          <a:bodyPr>
+            <a:normAutofit fontScale="90000"/>
+          </a:bodyPr>
+          <a:lstStyle/>
+          <a:p>
+            <a:pPr algn="ctr"/>
+            <a:r>
+              <a:rPr lang="es-ES" b="1" dirty="0"/>
+              <a:t>Viabilidad Y MARKETING</a:t>
+            </a:r>
+          </a:p>
+        </p:txBody>
+      </p:sp>
+      <p:pic>
+        <p:nvPicPr>
+          <p:cNvPr id="5" name="Imagen 4">
+            <a:extLst>
+              <a:ext uri="{FF2B5EF4-FFF2-40B4-BE49-F238E27FC236}">
+                <a16:creationId xmlns:a16="http://schemas.microsoft.com/office/drawing/2014/main" id="{C88F1ABA-B1C0-4AC9-A508-D32F49478E9E}"/>
+              </a:ext>
+            </a:extLst>
+          </p:cNvPr>
+          <p:cNvPicPr>
+            <a:picLocks noChangeAspect="1"/>
+          </p:cNvPicPr>
+          <p:nvPr/>
+        </p:nvPicPr>
+        <p:blipFill>
+          <a:blip r:embed="rId2"/>
+          <a:stretch>
+            <a:fillRect/>
+          </a:stretch>
+        </p:blipFill>
+        <p:spPr>
+          <a:xfrm>
+            <a:off x="0" y="522514"/>
+            <a:ext cx="12192000" cy="6335486"/>
+          </a:xfrm>
+          <a:prstGeom prst="rect">
+            <a:avLst/>
+          </a:prstGeom>
+        </p:spPr>
+      </p:pic>
+    </p:spTree>
+    <p:extLst>
+      <p:ext uri="{BB962C8B-B14F-4D97-AF65-F5344CB8AC3E}">
+        <p14:creationId xmlns:p14="http://schemas.microsoft.com/office/powerpoint/2010/main" val="3346514039"/>
+      </p:ext>
+    </p:extLst>
+  </p:cSld>
+  <p:clrMapOvr>
+    <a:masterClrMapping/>
+  </p:clrMapOvr>
+</p:sld>
+</file>
+
+<file path=ppt/slides/slide19.xml><?xml version="1.0" encoding="utf-8"?>
+<p:sld xmlns:a="http://schemas.openxmlformats.org/drawingml/2006/main" xmlns:r="http://schemas.openxmlformats.org/officeDocument/2006/relationships" xmlns:p="http://schemas.openxmlformats.org/presentationml/2006/main">
+  <p:cSld>
+    <p:spTree>
+      <p:nvGrpSpPr>
+        <p:cNvPr id="1" name=""/>
+        <p:cNvGrpSpPr/>
+        <p:nvPr/>
+      </p:nvGrpSpPr>
+      <p:grpSpPr>
+        <a:xfrm>
+          <a:off x="0" y="0"/>
+          <a:ext cx="0" cy="0"/>
+          <a:chOff x="0" y="0"/>
+          <a:chExt cx="0" cy="0"/>
+        </a:xfrm>
+      </p:grpSpPr>
+      <p:sp>
+        <p:nvSpPr>
+          <p:cNvPr id="2" name="Título 1">
+            <a:extLst>
+              <a:ext uri="{FF2B5EF4-FFF2-40B4-BE49-F238E27FC236}">
+                <a16:creationId xmlns:a16="http://schemas.microsoft.com/office/drawing/2014/main" id="{1084BBE1-A7C8-4B51-974D-4913255554FA}"/>
+              </a:ext>
+            </a:extLst>
+          </p:cNvPr>
+          <p:cNvSpPr>
+            <a:spLocks noGrp="1"/>
+          </p:cNvSpPr>
+          <p:nvPr>
+            <p:ph type="title"/>
+          </p:nvPr>
+        </p:nvSpPr>
+        <p:spPr>
+          <a:xfrm>
+            <a:off x="1790700" y="0"/>
+            <a:ext cx="8610600" cy="522514"/>
+          </a:xfrm>
+        </p:spPr>
+        <p:txBody>
+          <a:bodyPr>
+            <a:normAutofit fontScale="90000"/>
+          </a:bodyPr>
+          <a:lstStyle/>
+          <a:p>
+            <a:pPr algn="ctr"/>
+            <a:r>
+              <a:rPr lang="es-ES" b="1" dirty="0"/>
+              <a:t>Historia de la humanidad</a:t>
+            </a:r>
+          </a:p>
+        </p:txBody>
+      </p:sp>
+      <p:pic>
+        <p:nvPicPr>
+          <p:cNvPr id="5" name="Imagen 4">
+            <a:extLst>
+              <a:ext uri="{FF2B5EF4-FFF2-40B4-BE49-F238E27FC236}">
+                <a16:creationId xmlns:a16="http://schemas.microsoft.com/office/drawing/2014/main" id="{5714882C-B796-48FF-9222-C8B31A268F2A}"/>
+              </a:ext>
+            </a:extLst>
+          </p:cNvPr>
+          <p:cNvPicPr>
+            <a:picLocks noChangeAspect="1"/>
+          </p:cNvPicPr>
+          <p:nvPr/>
+        </p:nvPicPr>
+        <p:blipFill>
+          <a:blip r:embed="rId2"/>
+          <a:stretch>
+            <a:fillRect/>
+          </a:stretch>
+        </p:blipFill>
+        <p:spPr>
+          <a:xfrm>
+            <a:off x="0" y="522514"/>
+            <a:ext cx="12192000" cy="6335486"/>
+          </a:xfrm>
+          <a:prstGeom prst="rect">
+            <a:avLst/>
+          </a:prstGeom>
+        </p:spPr>
+      </p:pic>
+    </p:spTree>
+    <p:extLst>
+      <p:ext uri="{BB962C8B-B14F-4D97-AF65-F5344CB8AC3E}">
+        <p14:creationId xmlns:p14="http://schemas.microsoft.com/office/powerpoint/2010/main" val="971297015"/>
+      </p:ext>
+    </p:extLst>
+  </p:cSld>
+  <p:clrMapOvr>
+    <a:masterClrMapping/>
+  </p:clrMapOvr>
+</p:sld>
+</file>
+
 <file path=ppt/slides/slide2.xml><?xml version="1.0" encoding="utf-8"?>
 <p:sld xmlns:a="http://schemas.openxmlformats.org/drawingml/2006/main" xmlns:r="http://schemas.openxmlformats.org/officeDocument/2006/relationships" xmlns:p="http://schemas.openxmlformats.org/presentationml/2006/main">
   <p:cSld>
@@ -6342,6 +7945,775 @@
   </p:cSld>
   <p:clrMapOvr>
     <a:overrideClrMapping bg1="dk1" tx1="lt1" bg2="dk2" tx2="lt2" accent1="accent1" accent2="accent2" accent3="accent3" accent4="accent4" accent5="accent5" accent6="accent6" hlink="hlink" folHlink="folHlink"/>
+  </p:clrMapOvr>
+</p:sld>
+</file>
+
+<file path=ppt/slides/slide20.xml><?xml version="1.0" encoding="utf-8"?>
+<p:sld xmlns:a="http://schemas.openxmlformats.org/drawingml/2006/main" xmlns:r="http://schemas.openxmlformats.org/officeDocument/2006/relationships" xmlns:p="http://schemas.openxmlformats.org/presentationml/2006/main">
+  <p:cSld>
+    <p:spTree>
+      <p:nvGrpSpPr>
+        <p:cNvPr id="1" name=""/>
+        <p:cNvGrpSpPr/>
+        <p:nvPr/>
+      </p:nvGrpSpPr>
+      <p:grpSpPr>
+        <a:xfrm>
+          <a:off x="0" y="0"/>
+          <a:ext cx="0" cy="0"/>
+          <a:chOff x="0" y="0"/>
+          <a:chExt cx="0" cy="0"/>
+        </a:xfrm>
+      </p:grpSpPr>
+      <p:sp>
+        <p:nvSpPr>
+          <p:cNvPr id="2" name="Título 1">
+            <a:extLst>
+              <a:ext uri="{FF2B5EF4-FFF2-40B4-BE49-F238E27FC236}">
+                <a16:creationId xmlns:a16="http://schemas.microsoft.com/office/drawing/2014/main" id="{1084BBE1-A7C8-4B51-974D-4913255554FA}"/>
+              </a:ext>
+            </a:extLst>
+          </p:cNvPr>
+          <p:cNvSpPr>
+            <a:spLocks noGrp="1"/>
+          </p:cNvSpPr>
+          <p:nvPr>
+            <p:ph type="title"/>
+          </p:nvPr>
+        </p:nvSpPr>
+        <p:spPr>
+          <a:xfrm>
+            <a:off x="1790700" y="0"/>
+            <a:ext cx="8610600" cy="522514"/>
+          </a:xfrm>
+        </p:spPr>
+        <p:txBody>
+          <a:bodyPr>
+            <a:normAutofit fontScale="90000"/>
+          </a:bodyPr>
+          <a:lstStyle/>
+          <a:p>
+            <a:pPr algn="ctr"/>
+            <a:r>
+              <a:rPr lang="es-ES" b="1"/>
+              <a:t>Historia de EGIPTO</a:t>
+            </a:r>
+            <a:endParaRPr lang="es-ES" b="1" dirty="0"/>
+          </a:p>
+        </p:txBody>
+      </p:sp>
+      <p:pic>
+        <p:nvPicPr>
+          <p:cNvPr id="6" name="Imagen 5">
+            <a:extLst>
+              <a:ext uri="{FF2B5EF4-FFF2-40B4-BE49-F238E27FC236}">
+                <a16:creationId xmlns:a16="http://schemas.microsoft.com/office/drawing/2014/main" id="{6986FCAE-E6C8-4CF0-AC63-59CD20561D66}"/>
+              </a:ext>
+            </a:extLst>
+          </p:cNvPr>
+          <p:cNvPicPr>
+            <a:picLocks noChangeAspect="1"/>
+          </p:cNvPicPr>
+          <p:nvPr/>
+        </p:nvPicPr>
+        <p:blipFill>
+          <a:blip r:embed="rId2"/>
+          <a:stretch>
+            <a:fillRect/>
+          </a:stretch>
+        </p:blipFill>
+        <p:spPr>
+          <a:xfrm>
+            <a:off x="0" y="522514"/>
+            <a:ext cx="12191999" cy="6335486"/>
+          </a:xfrm>
+          <a:prstGeom prst="rect">
+            <a:avLst/>
+          </a:prstGeom>
+        </p:spPr>
+      </p:pic>
+    </p:spTree>
+    <p:extLst>
+      <p:ext uri="{BB962C8B-B14F-4D97-AF65-F5344CB8AC3E}">
+        <p14:creationId xmlns:p14="http://schemas.microsoft.com/office/powerpoint/2010/main" val="3917105080"/>
+      </p:ext>
+    </p:extLst>
+  </p:cSld>
+  <p:clrMapOvr>
+    <a:masterClrMapping/>
+  </p:clrMapOvr>
+</p:sld>
+</file>
+
+<file path=ppt/slides/slide21.xml><?xml version="1.0" encoding="utf-8"?>
+<p:sld xmlns:a="http://schemas.openxmlformats.org/drawingml/2006/main" xmlns:r="http://schemas.openxmlformats.org/officeDocument/2006/relationships" xmlns:p="http://schemas.openxmlformats.org/presentationml/2006/main">
+  <p:cSld>
+    <p:spTree>
+      <p:nvGrpSpPr>
+        <p:cNvPr id="1" name=""/>
+        <p:cNvGrpSpPr/>
+        <p:nvPr/>
+      </p:nvGrpSpPr>
+      <p:grpSpPr>
+        <a:xfrm>
+          <a:off x="0" y="0"/>
+          <a:ext cx="0" cy="0"/>
+          <a:chOff x="0" y="0"/>
+          <a:chExt cx="0" cy="0"/>
+        </a:xfrm>
+      </p:grpSpPr>
+      <p:sp>
+        <p:nvSpPr>
+          <p:cNvPr id="2" name="Título 1">
+            <a:extLst>
+              <a:ext uri="{FF2B5EF4-FFF2-40B4-BE49-F238E27FC236}">
+                <a16:creationId xmlns:a16="http://schemas.microsoft.com/office/drawing/2014/main" id="{1084BBE1-A7C8-4B51-974D-4913255554FA}"/>
+              </a:ext>
+            </a:extLst>
+          </p:cNvPr>
+          <p:cNvSpPr>
+            <a:spLocks noGrp="1"/>
+          </p:cNvSpPr>
+          <p:nvPr>
+            <p:ph type="title"/>
+          </p:nvPr>
+        </p:nvSpPr>
+        <p:spPr>
+          <a:xfrm>
+            <a:off x="1790700" y="0"/>
+            <a:ext cx="8610600" cy="522514"/>
+          </a:xfrm>
+        </p:spPr>
+        <p:txBody>
+          <a:bodyPr>
+            <a:normAutofit fontScale="90000"/>
+          </a:bodyPr>
+          <a:lstStyle/>
+          <a:p>
+            <a:pPr algn="ctr"/>
+            <a:r>
+              <a:rPr lang="es-ES" b="1" dirty="0"/>
+              <a:t>Historia de GRECIA</a:t>
+            </a:r>
+          </a:p>
+        </p:txBody>
+      </p:sp>
+      <p:pic>
+        <p:nvPicPr>
+          <p:cNvPr id="5" name="Imagen 4">
+            <a:extLst>
+              <a:ext uri="{FF2B5EF4-FFF2-40B4-BE49-F238E27FC236}">
+                <a16:creationId xmlns:a16="http://schemas.microsoft.com/office/drawing/2014/main" id="{C602590C-C2F7-45B0-9419-6F48C3F7A246}"/>
+              </a:ext>
+            </a:extLst>
+          </p:cNvPr>
+          <p:cNvPicPr>
+            <a:picLocks noChangeAspect="1"/>
+          </p:cNvPicPr>
+          <p:nvPr/>
+        </p:nvPicPr>
+        <p:blipFill>
+          <a:blip r:embed="rId2"/>
+          <a:stretch>
+            <a:fillRect/>
+          </a:stretch>
+        </p:blipFill>
+        <p:spPr>
+          <a:xfrm>
+            <a:off x="0" y="522514"/>
+            <a:ext cx="12191999" cy="6335486"/>
+          </a:xfrm>
+          <a:prstGeom prst="rect">
+            <a:avLst/>
+          </a:prstGeom>
+        </p:spPr>
+      </p:pic>
+    </p:spTree>
+    <p:extLst>
+      <p:ext uri="{BB962C8B-B14F-4D97-AF65-F5344CB8AC3E}">
+        <p14:creationId xmlns:p14="http://schemas.microsoft.com/office/powerpoint/2010/main" val="2516362359"/>
+      </p:ext>
+    </p:extLst>
+  </p:cSld>
+  <p:clrMapOvr>
+    <a:masterClrMapping/>
+  </p:clrMapOvr>
+</p:sld>
+</file>
+
+<file path=ppt/slides/slide22.xml><?xml version="1.0" encoding="utf-8"?>
+<p:sld xmlns:a="http://schemas.openxmlformats.org/drawingml/2006/main" xmlns:r="http://schemas.openxmlformats.org/officeDocument/2006/relationships" xmlns:p="http://schemas.openxmlformats.org/presentationml/2006/main">
+  <p:cSld>
+    <p:spTree>
+      <p:nvGrpSpPr>
+        <p:cNvPr id="1" name=""/>
+        <p:cNvGrpSpPr/>
+        <p:nvPr/>
+      </p:nvGrpSpPr>
+      <p:grpSpPr>
+        <a:xfrm>
+          <a:off x="0" y="0"/>
+          <a:ext cx="0" cy="0"/>
+          <a:chOff x="0" y="0"/>
+          <a:chExt cx="0" cy="0"/>
+        </a:xfrm>
+      </p:grpSpPr>
+      <p:sp>
+        <p:nvSpPr>
+          <p:cNvPr id="2" name="Título 1">
+            <a:extLst>
+              <a:ext uri="{FF2B5EF4-FFF2-40B4-BE49-F238E27FC236}">
+                <a16:creationId xmlns:a16="http://schemas.microsoft.com/office/drawing/2014/main" id="{1084BBE1-A7C8-4B51-974D-4913255554FA}"/>
+              </a:ext>
+            </a:extLst>
+          </p:cNvPr>
+          <p:cNvSpPr>
+            <a:spLocks noGrp="1"/>
+          </p:cNvSpPr>
+          <p:nvPr>
+            <p:ph type="title"/>
+          </p:nvPr>
+        </p:nvSpPr>
+        <p:spPr>
+          <a:xfrm>
+            <a:off x="1790700" y="0"/>
+            <a:ext cx="8610600" cy="522514"/>
+          </a:xfrm>
+        </p:spPr>
+        <p:txBody>
+          <a:bodyPr>
+            <a:normAutofit fontScale="90000"/>
+          </a:bodyPr>
+          <a:lstStyle/>
+          <a:p>
+            <a:pPr algn="ctr"/>
+            <a:r>
+              <a:rPr lang="es-ES" b="1" dirty="0"/>
+              <a:t>HISTORIA DE LATINOAMERICA</a:t>
+            </a:r>
+          </a:p>
+        </p:txBody>
+      </p:sp>
+      <p:pic>
+        <p:nvPicPr>
+          <p:cNvPr id="5" name="Imagen 4">
+            <a:extLst>
+              <a:ext uri="{FF2B5EF4-FFF2-40B4-BE49-F238E27FC236}">
+                <a16:creationId xmlns:a16="http://schemas.microsoft.com/office/drawing/2014/main" id="{E07E33B4-1696-41AD-8AEE-1AC4E5FD8D82}"/>
+              </a:ext>
+            </a:extLst>
+          </p:cNvPr>
+          <p:cNvPicPr>
+            <a:picLocks noChangeAspect="1"/>
+          </p:cNvPicPr>
+          <p:nvPr/>
+        </p:nvPicPr>
+        <p:blipFill>
+          <a:blip r:embed="rId3"/>
+          <a:stretch>
+            <a:fillRect/>
+          </a:stretch>
+        </p:blipFill>
+        <p:spPr>
+          <a:xfrm>
+            <a:off x="0" y="522514"/>
+            <a:ext cx="12192000" cy="6335486"/>
+          </a:xfrm>
+          <a:prstGeom prst="rect">
+            <a:avLst/>
+          </a:prstGeom>
+        </p:spPr>
+      </p:pic>
+    </p:spTree>
+    <p:extLst>
+      <p:ext uri="{BB962C8B-B14F-4D97-AF65-F5344CB8AC3E}">
+        <p14:creationId xmlns:p14="http://schemas.microsoft.com/office/powerpoint/2010/main" val="1928235718"/>
+      </p:ext>
+    </p:extLst>
+  </p:cSld>
+  <p:clrMapOvr>
+    <a:masterClrMapping/>
+  </p:clrMapOvr>
+</p:sld>
+</file>
+
+<file path=ppt/slides/slide23.xml><?xml version="1.0" encoding="utf-8"?>
+<p:sld xmlns:a="http://schemas.openxmlformats.org/drawingml/2006/main" xmlns:r="http://schemas.openxmlformats.org/officeDocument/2006/relationships" xmlns:p="http://schemas.openxmlformats.org/presentationml/2006/main">
+  <p:cSld>
+    <p:spTree>
+      <p:nvGrpSpPr>
+        <p:cNvPr id="1" name=""/>
+        <p:cNvGrpSpPr/>
+        <p:nvPr/>
+      </p:nvGrpSpPr>
+      <p:grpSpPr>
+        <a:xfrm>
+          <a:off x="0" y="0"/>
+          <a:ext cx="0" cy="0"/>
+          <a:chOff x="0" y="0"/>
+          <a:chExt cx="0" cy="0"/>
+        </a:xfrm>
+      </p:grpSpPr>
+      <p:sp>
+        <p:nvSpPr>
+          <p:cNvPr id="2" name="Título 1">
+            <a:extLst>
+              <a:ext uri="{FF2B5EF4-FFF2-40B4-BE49-F238E27FC236}">
+                <a16:creationId xmlns:a16="http://schemas.microsoft.com/office/drawing/2014/main" id="{1084BBE1-A7C8-4B51-974D-4913255554FA}"/>
+              </a:ext>
+            </a:extLst>
+          </p:cNvPr>
+          <p:cNvSpPr>
+            <a:spLocks noGrp="1"/>
+          </p:cNvSpPr>
+          <p:nvPr>
+            <p:ph type="title"/>
+          </p:nvPr>
+        </p:nvSpPr>
+        <p:spPr>
+          <a:xfrm>
+            <a:off x="1790700" y="0"/>
+            <a:ext cx="8610600" cy="522514"/>
+          </a:xfrm>
+        </p:spPr>
+        <p:txBody>
+          <a:bodyPr>
+            <a:normAutofit fontScale="90000"/>
+          </a:bodyPr>
+          <a:lstStyle/>
+          <a:p>
+            <a:pPr algn="ctr"/>
+            <a:r>
+              <a:rPr lang="es-ES" b="1" dirty="0"/>
+              <a:t>Historia azteca</a:t>
+            </a:r>
+          </a:p>
+        </p:txBody>
+      </p:sp>
+      <p:pic>
+        <p:nvPicPr>
+          <p:cNvPr id="9" name="Imagen 8">
+            <a:extLst>
+              <a:ext uri="{FF2B5EF4-FFF2-40B4-BE49-F238E27FC236}">
+                <a16:creationId xmlns:a16="http://schemas.microsoft.com/office/drawing/2014/main" id="{276D9067-EC48-45E3-AC3B-47CF50DD33CD}"/>
+              </a:ext>
+            </a:extLst>
+          </p:cNvPr>
+          <p:cNvPicPr>
+            <a:picLocks noChangeAspect="1"/>
+          </p:cNvPicPr>
+          <p:nvPr/>
+        </p:nvPicPr>
+        <p:blipFill>
+          <a:blip r:embed="rId2"/>
+          <a:stretch>
+            <a:fillRect/>
+          </a:stretch>
+        </p:blipFill>
+        <p:spPr>
+          <a:xfrm>
+            <a:off x="0" y="522514"/>
+            <a:ext cx="12192000" cy="6335486"/>
+          </a:xfrm>
+          <a:prstGeom prst="rect">
+            <a:avLst/>
+          </a:prstGeom>
+        </p:spPr>
+      </p:pic>
+    </p:spTree>
+    <p:extLst>
+      <p:ext uri="{BB962C8B-B14F-4D97-AF65-F5344CB8AC3E}">
+        <p14:creationId xmlns:p14="http://schemas.microsoft.com/office/powerpoint/2010/main" val="1578319285"/>
+      </p:ext>
+    </p:extLst>
+  </p:cSld>
+  <p:clrMapOvr>
+    <a:masterClrMapping/>
+  </p:clrMapOvr>
+</p:sld>
+</file>
+
+<file path=ppt/slides/slide24.xml><?xml version="1.0" encoding="utf-8"?>
+<p:sld xmlns:a="http://schemas.openxmlformats.org/drawingml/2006/main" xmlns:r="http://schemas.openxmlformats.org/officeDocument/2006/relationships" xmlns:p="http://schemas.openxmlformats.org/presentationml/2006/main">
+  <p:cSld>
+    <p:spTree>
+      <p:nvGrpSpPr>
+        <p:cNvPr id="1" name=""/>
+        <p:cNvGrpSpPr/>
+        <p:nvPr/>
+      </p:nvGrpSpPr>
+      <p:grpSpPr>
+        <a:xfrm>
+          <a:off x="0" y="0"/>
+          <a:ext cx="0" cy="0"/>
+          <a:chOff x="0" y="0"/>
+          <a:chExt cx="0" cy="0"/>
+        </a:xfrm>
+      </p:grpSpPr>
+      <p:sp>
+        <p:nvSpPr>
+          <p:cNvPr id="2" name="Título 1">
+            <a:extLst>
+              <a:ext uri="{FF2B5EF4-FFF2-40B4-BE49-F238E27FC236}">
+                <a16:creationId xmlns:a16="http://schemas.microsoft.com/office/drawing/2014/main" id="{1084BBE1-A7C8-4B51-974D-4913255554FA}"/>
+              </a:ext>
+            </a:extLst>
+          </p:cNvPr>
+          <p:cNvSpPr>
+            <a:spLocks noGrp="1"/>
+          </p:cNvSpPr>
+          <p:nvPr>
+            <p:ph type="title"/>
+          </p:nvPr>
+        </p:nvSpPr>
+        <p:spPr>
+          <a:xfrm>
+            <a:off x="1790700" y="0"/>
+            <a:ext cx="8610600" cy="522514"/>
+          </a:xfrm>
+        </p:spPr>
+        <p:txBody>
+          <a:bodyPr>
+            <a:normAutofit fontScale="90000"/>
+          </a:bodyPr>
+          <a:lstStyle/>
+          <a:p>
+            <a:pPr algn="ctr"/>
+            <a:r>
+              <a:rPr lang="es-ES" b="1" dirty="0"/>
+              <a:t>Historia INCA</a:t>
+            </a:r>
+          </a:p>
+        </p:txBody>
+      </p:sp>
+      <p:pic>
+        <p:nvPicPr>
+          <p:cNvPr id="5" name="Imagen 4">
+            <a:extLst>
+              <a:ext uri="{FF2B5EF4-FFF2-40B4-BE49-F238E27FC236}">
+                <a16:creationId xmlns:a16="http://schemas.microsoft.com/office/drawing/2014/main" id="{112544F8-6A8B-4055-8282-BB96BC3BC61E}"/>
+              </a:ext>
+            </a:extLst>
+          </p:cNvPr>
+          <p:cNvPicPr>
+            <a:picLocks noChangeAspect="1"/>
+          </p:cNvPicPr>
+          <p:nvPr/>
+        </p:nvPicPr>
+        <p:blipFill>
+          <a:blip r:embed="rId2"/>
+          <a:stretch>
+            <a:fillRect/>
+          </a:stretch>
+        </p:blipFill>
+        <p:spPr>
+          <a:xfrm>
+            <a:off x="0" y="522514"/>
+            <a:ext cx="12192000" cy="6335486"/>
+          </a:xfrm>
+          <a:prstGeom prst="rect">
+            <a:avLst/>
+          </a:prstGeom>
+        </p:spPr>
+      </p:pic>
+    </p:spTree>
+    <p:extLst>
+      <p:ext uri="{BB962C8B-B14F-4D97-AF65-F5344CB8AC3E}">
+        <p14:creationId xmlns:p14="http://schemas.microsoft.com/office/powerpoint/2010/main" val="3327078883"/>
+      </p:ext>
+    </p:extLst>
+  </p:cSld>
+  <p:clrMapOvr>
+    <a:masterClrMapping/>
+  </p:clrMapOvr>
+</p:sld>
+</file>
+
+<file path=ppt/slides/slide25.xml><?xml version="1.0" encoding="utf-8"?>
+<p:sld xmlns:a="http://schemas.openxmlformats.org/drawingml/2006/main" xmlns:r="http://schemas.openxmlformats.org/officeDocument/2006/relationships" xmlns:p="http://schemas.openxmlformats.org/presentationml/2006/main">
+  <p:cSld>
+    <p:spTree>
+      <p:nvGrpSpPr>
+        <p:cNvPr id="1" name=""/>
+        <p:cNvGrpSpPr/>
+        <p:nvPr/>
+      </p:nvGrpSpPr>
+      <p:grpSpPr>
+        <a:xfrm>
+          <a:off x="0" y="0"/>
+          <a:ext cx="0" cy="0"/>
+          <a:chOff x="0" y="0"/>
+          <a:chExt cx="0" cy="0"/>
+        </a:xfrm>
+      </p:grpSpPr>
+      <p:sp>
+        <p:nvSpPr>
+          <p:cNvPr id="2" name="Título 1">
+            <a:extLst>
+              <a:ext uri="{FF2B5EF4-FFF2-40B4-BE49-F238E27FC236}">
+                <a16:creationId xmlns:a16="http://schemas.microsoft.com/office/drawing/2014/main" id="{1084BBE1-A7C8-4B51-974D-4913255554FA}"/>
+              </a:ext>
+            </a:extLst>
+          </p:cNvPr>
+          <p:cNvSpPr>
+            <a:spLocks noGrp="1"/>
+          </p:cNvSpPr>
+          <p:nvPr>
+            <p:ph type="title"/>
+          </p:nvPr>
+        </p:nvSpPr>
+        <p:spPr>
+          <a:xfrm>
+            <a:off x="1790700" y="0"/>
+            <a:ext cx="8610600" cy="522514"/>
+          </a:xfrm>
+        </p:spPr>
+        <p:txBody>
+          <a:bodyPr>
+            <a:normAutofit fontScale="90000"/>
+          </a:bodyPr>
+          <a:lstStyle/>
+          <a:p>
+            <a:pPr algn="ctr"/>
+            <a:r>
+              <a:rPr lang="es-ES" b="1" dirty="0"/>
+              <a:t>Historia MAYA</a:t>
+            </a:r>
+          </a:p>
+        </p:txBody>
+      </p:sp>
+      <p:pic>
+        <p:nvPicPr>
+          <p:cNvPr id="5" name="Imagen 4">
+            <a:extLst>
+              <a:ext uri="{FF2B5EF4-FFF2-40B4-BE49-F238E27FC236}">
+                <a16:creationId xmlns:a16="http://schemas.microsoft.com/office/drawing/2014/main" id="{E267C78A-D5ED-46BA-A6AE-97B9B1E453D8}"/>
+              </a:ext>
+            </a:extLst>
+          </p:cNvPr>
+          <p:cNvPicPr>
+            <a:picLocks noChangeAspect="1"/>
+          </p:cNvPicPr>
+          <p:nvPr/>
+        </p:nvPicPr>
+        <p:blipFill>
+          <a:blip r:embed="rId2"/>
+          <a:stretch>
+            <a:fillRect/>
+          </a:stretch>
+        </p:blipFill>
+        <p:spPr>
+          <a:xfrm>
+            <a:off x="0" y="522514"/>
+            <a:ext cx="12192000" cy="6335486"/>
+          </a:xfrm>
+          <a:prstGeom prst="rect">
+            <a:avLst/>
+          </a:prstGeom>
+        </p:spPr>
+      </p:pic>
+    </p:spTree>
+    <p:extLst>
+      <p:ext uri="{BB962C8B-B14F-4D97-AF65-F5344CB8AC3E}">
+        <p14:creationId xmlns:p14="http://schemas.microsoft.com/office/powerpoint/2010/main" val="3908591399"/>
+      </p:ext>
+    </p:extLst>
+  </p:cSld>
+  <p:clrMapOvr>
+    <a:masterClrMapping/>
+  </p:clrMapOvr>
+</p:sld>
+</file>
+
+<file path=ppt/slides/slide26.xml><?xml version="1.0" encoding="utf-8"?>
+<p:sld xmlns:a="http://schemas.openxmlformats.org/drawingml/2006/main" xmlns:r="http://schemas.openxmlformats.org/officeDocument/2006/relationships" xmlns:p="http://schemas.openxmlformats.org/presentationml/2006/main">
+  <p:cSld>
+    <p:spTree>
+      <p:nvGrpSpPr>
+        <p:cNvPr id="1" name=""/>
+        <p:cNvGrpSpPr/>
+        <p:nvPr/>
+      </p:nvGrpSpPr>
+      <p:grpSpPr>
+        <a:xfrm>
+          <a:off x="0" y="0"/>
+          <a:ext cx="0" cy="0"/>
+          <a:chOff x="0" y="0"/>
+          <a:chExt cx="0" cy="0"/>
+        </a:xfrm>
+      </p:grpSpPr>
+      <p:sp>
+        <p:nvSpPr>
+          <p:cNvPr id="2" name="Título 1">
+            <a:extLst>
+              <a:ext uri="{FF2B5EF4-FFF2-40B4-BE49-F238E27FC236}">
+                <a16:creationId xmlns:a16="http://schemas.microsoft.com/office/drawing/2014/main" id="{1084BBE1-A7C8-4B51-974D-4913255554FA}"/>
+              </a:ext>
+            </a:extLst>
+          </p:cNvPr>
+          <p:cNvSpPr>
+            <a:spLocks noGrp="1"/>
+          </p:cNvSpPr>
+          <p:nvPr>
+            <p:ph type="title"/>
+          </p:nvPr>
+        </p:nvSpPr>
+        <p:spPr>
+          <a:xfrm>
+            <a:off x="1790700" y="0"/>
+            <a:ext cx="8610600" cy="522514"/>
+          </a:xfrm>
+        </p:spPr>
+        <p:txBody>
+          <a:bodyPr>
+            <a:normAutofit fontScale="90000"/>
+          </a:bodyPr>
+          <a:lstStyle/>
+          <a:p>
+            <a:pPr algn="ctr"/>
+            <a:r>
+              <a:rPr lang="es-ES" b="1" dirty="0"/>
+              <a:t>Historia NORDICA</a:t>
+            </a:r>
+          </a:p>
+        </p:txBody>
+      </p:sp>
+      <p:pic>
+        <p:nvPicPr>
+          <p:cNvPr id="5" name="Imagen 4">
+            <a:extLst>
+              <a:ext uri="{FF2B5EF4-FFF2-40B4-BE49-F238E27FC236}">
+                <a16:creationId xmlns:a16="http://schemas.microsoft.com/office/drawing/2014/main" id="{4D488679-E72D-480B-BBDF-7A5A54201F3D}"/>
+              </a:ext>
+            </a:extLst>
+          </p:cNvPr>
+          <p:cNvPicPr>
+            <a:picLocks noChangeAspect="1"/>
+          </p:cNvPicPr>
+          <p:nvPr/>
+        </p:nvPicPr>
+        <p:blipFill>
+          <a:blip r:embed="rId2"/>
+          <a:stretch>
+            <a:fillRect/>
+          </a:stretch>
+        </p:blipFill>
+        <p:spPr>
+          <a:xfrm>
+            <a:off x="0" y="522514"/>
+            <a:ext cx="12192000" cy="6335486"/>
+          </a:xfrm>
+          <a:prstGeom prst="rect">
+            <a:avLst/>
+          </a:prstGeom>
+        </p:spPr>
+      </p:pic>
+    </p:spTree>
+    <p:extLst>
+      <p:ext uri="{BB962C8B-B14F-4D97-AF65-F5344CB8AC3E}">
+        <p14:creationId xmlns:p14="http://schemas.microsoft.com/office/powerpoint/2010/main" val="444858557"/>
+      </p:ext>
+    </p:extLst>
+  </p:cSld>
+  <p:clrMapOvr>
+    <a:masterClrMapping/>
+  </p:clrMapOvr>
+</p:sld>
+</file>
+
+<file path=ppt/slides/slide27.xml><?xml version="1.0" encoding="utf-8"?>
+<p:sld xmlns:a="http://schemas.openxmlformats.org/drawingml/2006/main" xmlns:r="http://schemas.openxmlformats.org/officeDocument/2006/relationships" xmlns:p="http://schemas.openxmlformats.org/presentationml/2006/main">
+  <p:cSld>
+    <p:spTree>
+      <p:nvGrpSpPr>
+        <p:cNvPr id="1" name=""/>
+        <p:cNvGrpSpPr/>
+        <p:nvPr/>
+      </p:nvGrpSpPr>
+      <p:grpSpPr>
+        <a:xfrm>
+          <a:off x="0" y="0"/>
+          <a:ext cx="0" cy="0"/>
+          <a:chOff x="0" y="0"/>
+          <a:chExt cx="0" cy="0"/>
+        </a:xfrm>
+      </p:grpSpPr>
+      <p:sp>
+        <p:nvSpPr>
+          <p:cNvPr id="2" name="Título 1">
+            <a:extLst>
+              <a:ext uri="{FF2B5EF4-FFF2-40B4-BE49-F238E27FC236}">
+                <a16:creationId xmlns:a16="http://schemas.microsoft.com/office/drawing/2014/main" id="{1084BBE1-A7C8-4B51-974D-4913255554FA}"/>
+              </a:ext>
+            </a:extLst>
+          </p:cNvPr>
+          <p:cNvSpPr>
+            <a:spLocks noGrp="1"/>
+          </p:cNvSpPr>
+          <p:nvPr>
+            <p:ph type="title"/>
+          </p:nvPr>
+        </p:nvSpPr>
+        <p:spPr>
+          <a:xfrm>
+            <a:off x="1790700" y="0"/>
+            <a:ext cx="8610600" cy="522514"/>
+          </a:xfrm>
+        </p:spPr>
+        <p:txBody>
+          <a:bodyPr>
+            <a:normAutofit fontScale="90000"/>
+          </a:bodyPr>
+          <a:lstStyle/>
+          <a:p>
+            <a:pPr algn="ctr"/>
+            <a:r>
+              <a:rPr lang="es-ES" b="1" dirty="0"/>
+              <a:t>CONTACTO</a:t>
+            </a:r>
+          </a:p>
+        </p:txBody>
+      </p:sp>
+      <p:pic>
+        <p:nvPicPr>
+          <p:cNvPr id="5" name="Imagen 4">
+            <a:extLst>
+              <a:ext uri="{FF2B5EF4-FFF2-40B4-BE49-F238E27FC236}">
+                <a16:creationId xmlns:a16="http://schemas.microsoft.com/office/drawing/2014/main" id="{01609A12-C986-48A4-B9E6-C77EB6563075}"/>
+              </a:ext>
+            </a:extLst>
+          </p:cNvPr>
+          <p:cNvPicPr>
+            <a:picLocks noChangeAspect="1"/>
+          </p:cNvPicPr>
+          <p:nvPr/>
+        </p:nvPicPr>
+        <p:blipFill>
+          <a:blip r:embed="rId2"/>
+          <a:stretch>
+            <a:fillRect/>
+          </a:stretch>
+        </p:blipFill>
+        <p:spPr>
+          <a:xfrm>
+            <a:off x="0" y="522514"/>
+            <a:ext cx="12191999" cy="6335485"/>
+          </a:xfrm>
+          <a:prstGeom prst="rect">
+            <a:avLst/>
+          </a:prstGeom>
+        </p:spPr>
+      </p:pic>
+    </p:spTree>
+    <p:extLst>
+      <p:ext uri="{BB962C8B-B14F-4D97-AF65-F5344CB8AC3E}">
+        <p14:creationId xmlns:p14="http://schemas.microsoft.com/office/powerpoint/2010/main" val="640648543"/>
+      </p:ext>
+    </p:extLst>
+  </p:cSld>
+  <p:clrMapOvr>
+    <a:masterClrMapping/>
   </p:clrMapOvr>
 </p:sld>
 </file>
@@ -7948,6 +10320,249 @@
     <p:extLst>
       <p:ext uri="{BB962C8B-B14F-4D97-AF65-F5344CB8AC3E}">
         <p14:creationId xmlns:p14="http://schemas.microsoft.com/office/powerpoint/2010/main" val="2967514377"/>
+      </p:ext>
+    </p:extLst>
+  </p:cSld>
+  <p:clrMapOvr>
+    <a:masterClrMapping/>
+  </p:clrMapOvr>
+</p:sld>
+</file>
+
+<file path=ppt/slides/slide8.xml><?xml version="1.0" encoding="utf-8"?>
+<p:sld xmlns:a="http://schemas.openxmlformats.org/drawingml/2006/main" xmlns:r="http://schemas.openxmlformats.org/officeDocument/2006/relationships" xmlns:p="http://schemas.openxmlformats.org/presentationml/2006/main">
+  <p:cSld>
+    <p:spTree>
+      <p:nvGrpSpPr>
+        <p:cNvPr id="1" name=""/>
+        <p:cNvGrpSpPr/>
+        <p:nvPr/>
+      </p:nvGrpSpPr>
+      <p:grpSpPr>
+        <a:xfrm>
+          <a:off x="0" y="0"/>
+          <a:ext cx="0" cy="0"/>
+          <a:chOff x="0" y="0"/>
+          <a:chExt cx="0" cy="0"/>
+        </a:xfrm>
+      </p:grpSpPr>
+      <p:sp>
+        <p:nvSpPr>
+          <p:cNvPr id="2" name="Título 1">
+            <a:extLst>
+              <a:ext uri="{FF2B5EF4-FFF2-40B4-BE49-F238E27FC236}">
+                <a16:creationId xmlns:a16="http://schemas.microsoft.com/office/drawing/2014/main" id="{CBA63D36-7AAA-429B-95D4-CD7C033D3DD6}"/>
+              </a:ext>
+            </a:extLst>
+          </p:cNvPr>
+          <p:cNvSpPr>
+            <a:spLocks noGrp="1"/>
+          </p:cNvSpPr>
+          <p:nvPr>
+            <p:ph type="title"/>
+          </p:nvPr>
+        </p:nvSpPr>
+        <p:spPr>
+          <a:xfrm>
+            <a:off x="1790700" y="0"/>
+            <a:ext cx="8610600" cy="571500"/>
+          </a:xfrm>
+        </p:spPr>
+        <p:txBody>
+          <a:bodyPr>
+            <a:normAutofit fontScale="90000"/>
+          </a:bodyPr>
+          <a:lstStyle/>
+          <a:p>
+            <a:pPr algn="ctr"/>
+            <a:r>
+              <a:rPr lang="es-ES" sz="4400" b="1" dirty="0"/>
+              <a:t>TRELLO</a:t>
+            </a:r>
+            <a:endParaRPr lang="es-ES" sz="8800" b="1" dirty="0"/>
+          </a:p>
+        </p:txBody>
+      </p:sp>
+      <p:pic>
+        <p:nvPicPr>
+          <p:cNvPr id="5" name="Imagen 4">
+            <a:extLst>
+              <a:ext uri="{FF2B5EF4-FFF2-40B4-BE49-F238E27FC236}">
+                <a16:creationId xmlns:a16="http://schemas.microsoft.com/office/drawing/2014/main" id="{A8C46D50-98F2-4230-B7F5-8B7BFC23E93B}"/>
+              </a:ext>
+            </a:extLst>
+          </p:cNvPr>
+          <p:cNvPicPr>
+            <a:picLocks noChangeAspect="1"/>
+          </p:cNvPicPr>
+          <p:nvPr/>
+        </p:nvPicPr>
+        <p:blipFill>
+          <a:blip r:embed="rId2"/>
+          <a:stretch>
+            <a:fillRect/>
+          </a:stretch>
+        </p:blipFill>
+        <p:spPr>
+          <a:xfrm>
+            <a:off x="0" y="571500"/>
+            <a:ext cx="12192000" cy="6286500"/>
+          </a:xfrm>
+          <a:prstGeom prst="rect">
+            <a:avLst/>
+          </a:prstGeom>
+        </p:spPr>
+      </p:pic>
+    </p:spTree>
+    <p:extLst>
+      <p:ext uri="{BB962C8B-B14F-4D97-AF65-F5344CB8AC3E}">
+        <p14:creationId xmlns:p14="http://schemas.microsoft.com/office/powerpoint/2010/main" val="2160658261"/>
+      </p:ext>
+    </p:extLst>
+  </p:cSld>
+  <p:clrMapOvr>
+    <a:masterClrMapping/>
+  </p:clrMapOvr>
+</p:sld>
+</file>
+
+<file path=ppt/slides/slide9.xml><?xml version="1.0" encoding="utf-8"?>
+<p:sld xmlns:a="http://schemas.openxmlformats.org/drawingml/2006/main" xmlns:r="http://schemas.openxmlformats.org/officeDocument/2006/relationships" xmlns:p="http://schemas.openxmlformats.org/presentationml/2006/main">
+  <p:cSld>
+    <p:spTree>
+      <p:nvGrpSpPr>
+        <p:cNvPr id="1" name=""/>
+        <p:cNvGrpSpPr/>
+        <p:nvPr/>
+      </p:nvGrpSpPr>
+      <p:grpSpPr>
+        <a:xfrm>
+          <a:off x="0" y="0"/>
+          <a:ext cx="0" cy="0"/>
+          <a:chOff x="0" y="0"/>
+          <a:chExt cx="0" cy="0"/>
+        </a:xfrm>
+      </p:grpSpPr>
+      <p:sp>
+        <p:nvSpPr>
+          <p:cNvPr id="2" name="Título 1">
+            <a:extLst>
+              <a:ext uri="{FF2B5EF4-FFF2-40B4-BE49-F238E27FC236}">
+                <a16:creationId xmlns:a16="http://schemas.microsoft.com/office/drawing/2014/main" id="{1BF6D8A5-5A7C-4A1E-9A7B-80228BB29845}"/>
+              </a:ext>
+            </a:extLst>
+          </p:cNvPr>
+          <p:cNvSpPr>
+            <a:spLocks noGrp="1"/>
+          </p:cNvSpPr>
+          <p:nvPr>
+            <p:ph type="title"/>
+          </p:nvPr>
+        </p:nvSpPr>
+        <p:spPr>
+          <a:xfrm>
+            <a:off x="1790700" y="0"/>
+            <a:ext cx="8610600" cy="473529"/>
+          </a:xfrm>
+        </p:spPr>
+        <p:txBody>
+          <a:bodyPr>
+            <a:normAutofit fontScale="90000"/>
+          </a:bodyPr>
+          <a:lstStyle/>
+          <a:p>
+            <a:pPr algn="ctr"/>
+            <a:r>
+              <a:rPr lang="es-ES" sz="4400" b="1" dirty="0"/>
+              <a:t>ERP</a:t>
+            </a:r>
+          </a:p>
+        </p:txBody>
+      </p:sp>
+      <p:sp>
+        <p:nvSpPr>
+          <p:cNvPr id="3" name="Marcador de contenido 2">
+            <a:extLst>
+              <a:ext uri="{FF2B5EF4-FFF2-40B4-BE49-F238E27FC236}">
+                <a16:creationId xmlns:a16="http://schemas.microsoft.com/office/drawing/2014/main" id="{8F1B779C-3C55-443D-978D-6BCF32930DE2}"/>
+              </a:ext>
+            </a:extLst>
+          </p:cNvPr>
+          <p:cNvSpPr>
+            <a:spLocks noGrp="1"/>
+          </p:cNvSpPr>
+          <p:nvPr>
+            <p:ph idx="1"/>
+          </p:nvPr>
+        </p:nvSpPr>
+        <p:spPr>
+          <a:xfrm>
+            <a:off x="0" y="473529"/>
+            <a:ext cx="12192000" cy="6384471"/>
+          </a:xfrm>
+        </p:spPr>
+        <p:txBody>
+          <a:bodyPr>
+            <a:normAutofit/>
+          </a:bodyPr>
+          <a:lstStyle/>
+          <a:p>
+            <a:pPr marL="0" indent="0">
+              <a:buNone/>
+            </a:pPr>
+            <a:r>
+              <a:rPr lang="es-ES" sz="3200" b="1" dirty="0" err="1"/>
+              <a:t>Formulari</a:t>
+            </a:r>
+            <a:r>
+              <a:rPr lang="es-ES" sz="3200" b="1" dirty="0"/>
+              <a:t> i taula </a:t>
+            </a:r>
+            <a:r>
+              <a:rPr lang="es-ES" sz="3200" b="1" dirty="0" err="1"/>
+              <a:t>clients</a:t>
+            </a:r>
+            <a:r>
+              <a:rPr lang="es-ES" sz="3200" b="1" dirty="0"/>
+              <a:t>:</a:t>
+            </a:r>
+          </a:p>
+        </p:txBody>
+      </p:sp>
+      <p:pic>
+        <p:nvPicPr>
+          <p:cNvPr id="5" name="Imagen 4">
+            <a:extLst>
+              <a:ext uri="{FF2B5EF4-FFF2-40B4-BE49-F238E27FC236}">
+                <a16:creationId xmlns:a16="http://schemas.microsoft.com/office/drawing/2014/main" id="{F95767F8-6D2D-408B-9C48-E0B1AD9F6167}"/>
+              </a:ext>
+            </a:extLst>
+          </p:cNvPr>
+          <p:cNvPicPr>
+            <a:picLocks noChangeAspect="1"/>
+          </p:cNvPicPr>
+          <p:nvPr/>
+        </p:nvPicPr>
+        <p:blipFill>
+          <a:blip r:embed="rId2"/>
+          <a:stretch>
+            <a:fillRect/>
+          </a:stretch>
+        </p:blipFill>
+        <p:spPr>
+          <a:xfrm>
+            <a:off x="0" y="947058"/>
+            <a:ext cx="12191999" cy="5910942"/>
+          </a:xfrm>
+          <a:prstGeom prst="rect">
+            <a:avLst/>
+          </a:prstGeom>
+        </p:spPr>
+      </p:pic>
+    </p:spTree>
+    <p:extLst>
+      <p:ext uri="{BB962C8B-B14F-4D97-AF65-F5344CB8AC3E}">
+        <p14:creationId xmlns:p14="http://schemas.microsoft.com/office/powerpoint/2010/main" val="3503380088"/>
       </p:ext>
     </p:extLst>
   </p:cSld>
@@ -8225,4 +10840,299 @@
     </a:ext>
   </a:extLst>
 </a:theme>
+</file>
+
+<file path=ppt/theme/theme2.xml><?xml version="1.0" encoding="utf-8"?>
+<a:theme xmlns:a="http://schemas.openxmlformats.org/drawingml/2006/main" name="Tema de Office">
+  <a:themeElements>
+    <a:clrScheme name="Office">
+      <a:dk1>
+        <a:sysClr val="windowText" lastClr="000000"/>
+      </a:dk1>
+      <a:lt1>
+        <a:sysClr val="window" lastClr="FFFFFF"/>
+      </a:lt1>
+      <a:dk2>
+        <a:srgbClr val="44546A"/>
+      </a:dk2>
+      <a:lt2>
+        <a:srgbClr val="E7E6E6"/>
+      </a:lt2>
+      <a:accent1>
+        <a:srgbClr val="4472C4"/>
+      </a:accent1>
+      <a:accent2>
+        <a:srgbClr val="ED7D31"/>
+      </a:accent2>
+      <a:accent3>
+        <a:srgbClr val="A5A5A5"/>
+      </a:accent3>
+      <a:accent4>
+        <a:srgbClr val="FFC000"/>
+      </a:accent4>
+      <a:accent5>
+        <a:srgbClr val="5B9BD5"/>
+      </a:accent5>
+      <a:accent6>
+        <a:srgbClr val="70AD47"/>
+      </a:accent6>
+      <a:hlink>
+        <a:srgbClr val="0563C1"/>
+      </a:hlink>
+      <a:folHlink>
+        <a:srgbClr val="954F72"/>
+      </a:folHlink>
+    </a:clrScheme>
+    <a:fontScheme name="Office">
+      <a:majorFont>
+        <a:latin typeface="Calibri Light" panose="020F0302020204030204"/>
+        <a:ea typeface=""/>
+        <a:cs typeface=""/>
+        <a:font script="Jpan" typeface="游ゴシック Light"/>
+        <a:font script="Hang" typeface="맑은 고딕"/>
+        <a:font script="Hans" typeface="等线 Light"/>
+        <a:font script="Hant" typeface="新細明體"/>
+        <a:font script="Arab" typeface="Times New Roman"/>
+        <a:font script="Hebr" typeface="Times New Roman"/>
+        <a:font script="Thai" typeface="Angsana New"/>
+        <a:font script="Ethi" typeface="Nyala"/>
+        <a:font script="Beng" typeface="Vrinda"/>
+        <a:font script="Gujr" typeface="Shruti"/>
+        <a:font script="Khmr" typeface="MoolBoran"/>
+        <a:font script="Knda" typeface="Tunga"/>
+        <a:font script="Guru" typeface="Raavi"/>
+        <a:font script="Cans" typeface="Euphemia"/>
+        <a:font script="Cher" typeface="Plantagenet Cherokee"/>
+        <a:font script="Yiii" typeface="Microsoft Yi Baiti"/>
+        <a:font script="Tibt" typeface="Microsoft Himalaya"/>
+        <a:font script="Thaa" typeface="MV Boli"/>
+        <a:font script="Deva" typeface="Mangal"/>
+        <a:font script="Telu" typeface="Gautami"/>
+        <a:font script="Taml" typeface="Latha"/>
+        <a:font script="Syrc" typeface="Estrangelo Edessa"/>
+        <a:font script="Orya" typeface="Kalinga"/>
+        <a:font script="Mlym" typeface="Kartika"/>
+        <a:font script="Laoo" typeface="DokChampa"/>
+        <a:font script="Sinh" typeface="Iskoola Pota"/>
+        <a:font script="Mong" typeface="Mongolian Baiti"/>
+        <a:font script="Viet" typeface="Times New Roman"/>
+        <a:font script="Uigh" typeface="Microsoft Uighur"/>
+        <a:font script="Geor" typeface="Sylfaen"/>
+        <a:font script="Armn" typeface="Arial"/>
+        <a:font script="Bugi" typeface="Leelawadee UI"/>
+        <a:font script="Bopo" typeface="Microsoft JhengHei"/>
+        <a:font script="Java" typeface="Javanese Text"/>
+        <a:font script="Lisu" typeface="Segoe UI"/>
+        <a:font script="Mymr" typeface="Myanmar Text"/>
+        <a:font script="Nkoo" typeface="Ebrima"/>
+        <a:font script="Olck" typeface="Nirmala UI"/>
+        <a:font script="Osma" typeface="Ebrima"/>
+        <a:font script="Phag" typeface="Phagspa"/>
+        <a:font script="Syrn" typeface="Estrangelo Edessa"/>
+        <a:font script="Syrj" typeface="Estrangelo Edessa"/>
+        <a:font script="Syre" typeface="Estrangelo Edessa"/>
+        <a:font script="Sora" typeface="Nirmala UI"/>
+        <a:font script="Tale" typeface="Microsoft Tai Le"/>
+        <a:font script="Talu" typeface="Microsoft New Tai Lue"/>
+        <a:font script="Tfng" typeface="Ebrima"/>
+      </a:majorFont>
+      <a:minorFont>
+        <a:latin typeface="Calibri" panose="020F0502020204030204"/>
+        <a:ea typeface=""/>
+        <a:cs typeface=""/>
+        <a:font script="Jpan" typeface="游ゴシック"/>
+        <a:font script="Hang" typeface="맑은 고딕"/>
+        <a:font script="Hans" typeface="等线"/>
+        <a:font script="Hant" typeface="新細明體"/>
+        <a:font script="Arab" typeface="Arial"/>
+        <a:font script="Hebr" typeface="Arial"/>
+        <a:font script="Thai" typeface="Cordia New"/>
+        <a:font script="Ethi" typeface="Nyala"/>
+        <a:font script="Beng" typeface="Vrinda"/>
+        <a:font script="Gujr" typeface="Shruti"/>
+        <a:font script="Khmr" typeface="DaunPenh"/>
+        <a:font script="Knda" typeface="Tunga"/>
+        <a:font script="Guru" typeface="Raavi"/>
+        <a:font script="Cans" typeface="Euphemia"/>
+        <a:font script="Cher" typeface="Plantagenet Cherokee"/>
+        <a:font script="Yiii" typeface="Microsoft Yi Baiti"/>
+        <a:font script="Tibt" typeface="Microsoft Himalaya"/>
+        <a:font script="Thaa" typeface="MV Boli"/>
+        <a:font script="Deva" typeface="Mangal"/>
+        <a:font script="Telu" typeface="Gautami"/>
+        <a:font script="Taml" typeface="Latha"/>
+        <a:font script="Syrc" typeface="Estrangelo Edessa"/>
+        <a:font script="Orya" typeface="Kalinga"/>
+        <a:font script="Mlym" typeface="Kartika"/>
+        <a:font script="Laoo" typeface="DokChampa"/>
+        <a:font script="Sinh" typeface="Iskoola Pota"/>
+        <a:font script="Mong" typeface="Mongolian Baiti"/>
+        <a:font script="Viet" typeface="Arial"/>
+        <a:font script="Uigh" typeface="Microsoft Uighur"/>
+        <a:font script="Geor" typeface="Sylfaen"/>
+        <a:font script="Armn" typeface="Arial"/>
+        <a:font script="Bugi" typeface="Leelawadee UI"/>
+        <a:font script="Bopo" typeface="Microsoft JhengHei"/>
+        <a:font script="Java" typeface="Javanese Text"/>
+        <a:font script="Lisu" typeface="Segoe UI"/>
+        <a:font script="Mymr" typeface="Myanmar Text"/>
+        <a:font script="Nkoo" typeface="Ebrima"/>
+        <a:font script="Olck" typeface="Nirmala UI"/>
+        <a:font script="Osma" typeface="Ebrima"/>
+        <a:font script="Phag" typeface="Phagspa"/>
+        <a:font script="Syrn" typeface="Estrangelo Edessa"/>
+        <a:font script="Syrj" typeface="Estrangelo Edessa"/>
+        <a:font script="Syre" typeface="Estrangelo Edessa"/>
+        <a:font script="Sora" typeface="Nirmala UI"/>
+        <a:font script="Tale" typeface="Microsoft Tai Le"/>
+        <a:font script="Talu" typeface="Microsoft New Tai Lue"/>
+        <a:font script="Tfng" typeface="Ebrima"/>
+      </a:minorFont>
+    </a:fontScheme>
+    <a:fmtScheme name="Office">
+      <a:fillStyleLst>
+        <a:solidFill>
+          <a:schemeClr val="phClr"/>
+        </a:solidFill>
+        <a:gradFill rotWithShape="1">
+          <a:gsLst>
+            <a:gs pos="0">
+              <a:schemeClr val="phClr">
+                <a:lumMod val="110000"/>
+                <a:satMod val="105000"/>
+                <a:tint val="67000"/>
+              </a:schemeClr>
+            </a:gs>
+            <a:gs pos="50000">
+              <a:schemeClr val="phClr">
+                <a:lumMod val="105000"/>
+                <a:satMod val="103000"/>
+                <a:tint val="73000"/>
+              </a:schemeClr>
+            </a:gs>
+            <a:gs pos="100000">
+              <a:schemeClr val="phClr">
+                <a:lumMod val="105000"/>
+                <a:satMod val="109000"/>
+                <a:tint val="81000"/>
+              </a:schemeClr>
+            </a:gs>
+          </a:gsLst>
+          <a:lin ang="5400000" scaled="0"/>
+        </a:gradFill>
+        <a:gradFill rotWithShape="1">
+          <a:gsLst>
+            <a:gs pos="0">
+              <a:schemeClr val="phClr">
+                <a:satMod val="103000"/>
+                <a:lumMod val="102000"/>
+                <a:tint val="94000"/>
+              </a:schemeClr>
+            </a:gs>
+            <a:gs pos="50000">
+              <a:schemeClr val="phClr">
+                <a:satMod val="110000"/>
+                <a:lumMod val="100000"/>
+                <a:shade val="100000"/>
+              </a:schemeClr>
+            </a:gs>
+            <a:gs pos="100000">
+              <a:schemeClr val="phClr">
+                <a:lumMod val="99000"/>
+                <a:satMod val="120000"/>
+                <a:shade val="78000"/>
+              </a:schemeClr>
+            </a:gs>
+          </a:gsLst>
+          <a:lin ang="5400000" scaled="0"/>
+        </a:gradFill>
+      </a:fillStyleLst>
+      <a:lnStyleLst>
+        <a:ln w="6350" cap="flat" cmpd="sng" algn="ctr">
+          <a:solidFill>
+            <a:schemeClr val="phClr"/>
+          </a:solidFill>
+          <a:prstDash val="solid"/>
+          <a:miter lim="800000"/>
+        </a:ln>
+        <a:ln w="12700" cap="flat" cmpd="sng" algn="ctr">
+          <a:solidFill>
+            <a:schemeClr val="phClr"/>
+          </a:solidFill>
+          <a:prstDash val="solid"/>
+          <a:miter lim="800000"/>
+        </a:ln>
+        <a:ln w="19050" cap="flat" cmpd="sng" algn="ctr">
+          <a:solidFill>
+            <a:schemeClr val="phClr"/>
+          </a:solidFill>
+          <a:prstDash val="solid"/>
+          <a:miter lim="800000"/>
+        </a:ln>
+      </a:lnStyleLst>
+      <a:effectStyleLst>
+        <a:effectStyle>
+          <a:effectLst/>
+        </a:effectStyle>
+        <a:effectStyle>
+          <a:effectLst/>
+        </a:effectStyle>
+        <a:effectStyle>
+          <a:effectLst>
+            <a:outerShdw blurRad="57150" dist="19050" dir="5400000" algn="ctr" rotWithShape="0">
+              <a:srgbClr val="000000">
+                <a:alpha val="63000"/>
+              </a:srgbClr>
+            </a:outerShdw>
+          </a:effectLst>
+        </a:effectStyle>
+      </a:effectStyleLst>
+      <a:bgFillStyleLst>
+        <a:solidFill>
+          <a:schemeClr val="phClr"/>
+        </a:solidFill>
+        <a:solidFill>
+          <a:schemeClr val="phClr">
+            <a:tint val="95000"/>
+            <a:satMod val="170000"/>
+          </a:schemeClr>
+        </a:solidFill>
+        <a:gradFill rotWithShape="1">
+          <a:gsLst>
+            <a:gs pos="0">
+              <a:schemeClr val="phClr">
+                <a:tint val="93000"/>
+                <a:satMod val="150000"/>
+                <a:shade val="98000"/>
+                <a:lumMod val="102000"/>
+              </a:schemeClr>
+            </a:gs>
+            <a:gs pos="50000">
+              <a:schemeClr val="phClr">
+                <a:tint val="98000"/>
+                <a:satMod val="130000"/>
+                <a:shade val="90000"/>
+                <a:lumMod val="103000"/>
+              </a:schemeClr>
+            </a:gs>
+            <a:gs pos="100000">
+              <a:schemeClr val="phClr">
+                <a:shade val="63000"/>
+                <a:satMod val="120000"/>
+              </a:schemeClr>
+            </a:gs>
+          </a:gsLst>
+          <a:lin ang="5400000" scaled="0"/>
+        </a:gradFill>
+      </a:bgFillStyleLst>
+    </a:fmtScheme>
+  </a:themeElements>
+  <a:objectDefaults/>
+  <a:extraClrSchemeLst/>
+  <a:extLst>
+    <a:ext uri="{05A4C25C-085E-4340-85A3-A5531E510DB2}">
+      <thm15:themeFamily xmlns:thm15="http://schemas.microsoft.com/office/thememl/2012/main" name="Office Theme" id="{62F939B6-93AF-4DB8-9C6B-D6C7DFDC589F}" vid="{4A3C46E8-61CC-4603-A589-7422A47A8E4A}"/>
+    </a:ext>
+  </a:extLst>
+</a:theme>
 </file>
</xml_diff>